<commit_message>
group 8 :light and dark
</commit_message>
<xml_diff>
--- a/projects/8/元宇宙项目介绍ppt.pptx
+++ b/projects/8/元宇宙项目介绍ppt.pptx
@@ -5,22 +5,26 @@
     <p:sldMasterId id="2147483648" r:id="rId1"/>
   </p:sldMasterIdLst>
   <p:notesMasterIdLst>
-    <p:notesMasterId r:id="rId14"/>
+    <p:notesMasterId r:id="rId17"/>
   </p:notesMasterIdLst>
   <p:sldIdLst>
-    <p:sldId id="272" r:id="rId3"/>
-    <p:sldId id="273" r:id="rId4"/>
-    <p:sldId id="274" r:id="rId5"/>
-    <p:sldId id="275" r:id="rId6"/>
-    <p:sldId id="267" r:id="rId7"/>
-    <p:sldId id="268" r:id="rId8"/>
-    <p:sldId id="269" r:id="rId9"/>
-    <p:sldId id="270" r:id="rId10"/>
-    <p:sldId id="276" r:id="rId11"/>
-    <p:sldId id="277" r:id="rId12"/>
-    <p:sldId id="278" r:id="rId13"/>
-    <p:sldId id="279" r:id="rId15"/>
-    <p:sldId id="280" r:id="rId16"/>
+    <p:sldId id="285" r:id="rId3"/>
+    <p:sldId id="272" r:id="rId4"/>
+    <p:sldId id="273" r:id="rId5"/>
+    <p:sldId id="274" r:id="rId6"/>
+    <p:sldId id="275" r:id="rId7"/>
+    <p:sldId id="286" r:id="rId8"/>
+    <p:sldId id="267" r:id="rId9"/>
+    <p:sldId id="268" r:id="rId10"/>
+    <p:sldId id="269" r:id="rId11"/>
+    <p:sldId id="287" r:id="rId12"/>
+    <p:sldId id="270" r:id="rId13"/>
+    <p:sldId id="276" r:id="rId14"/>
+    <p:sldId id="277" r:id="rId15"/>
+    <p:sldId id="278" r:id="rId16"/>
+    <p:sldId id="279" r:id="rId18"/>
+    <p:sldId id="288" r:id="rId19"/>
+    <p:sldId id="280" r:id="rId20"/>
   </p:sldIdLst>
   <p:sldSz cx="12192000" cy="6858000"/>
   <p:notesSz cx="7103745" cy="10234295"/>
@@ -3042,7 +3046,7 @@
         </p:nvSpPr>
         <p:spPr>
           <a:xfrm>
-            <a:off x="567055" y="372110"/>
+            <a:off x="5090160" y="2609215"/>
             <a:ext cx="2011680" cy="645160"/>
           </a:xfrm>
           <a:prstGeom prst="rect">
@@ -3066,298 +3070,6 @@
               <a:t>游戏简介</a:t>
             </a:r>
             <a:endParaRPr lang="zh-CN" altLang="en-US" sz="3600">
-              <a:solidFill>
-                <a:schemeClr val="bg1"/>
-              </a:solidFill>
-              <a:latin typeface="微软雅黑" charset="0"/>
-              <a:ea typeface="微软雅黑" charset="0"/>
-            </a:endParaRPr>
-          </a:p>
-        </p:txBody>
-      </p:sp>
-      <p:sp>
-        <p:nvSpPr>
-          <p:cNvPr id="2" name="文本框 1"/>
-          <p:cNvSpPr txBox="1"/>
-          <p:nvPr/>
-        </p:nvSpPr>
-        <p:spPr>
-          <a:xfrm>
-            <a:off x="567055" y="1297305"/>
-            <a:ext cx="7650480" cy="3969385"/>
-          </a:xfrm>
-          <a:prstGeom prst="rect">
-            <a:avLst/>
-          </a:prstGeom>
-          <a:noFill/>
-        </p:spPr>
-        <p:txBody>
-          <a:bodyPr wrap="none" rtlCol="0">
-            <a:spAutoFit/>
-          </a:bodyPr>
-          <a:p>
-            <a:pPr algn="l">
-              <a:lnSpc>
-                <a:spcPct val="100000"/>
-              </a:lnSpc>
-            </a:pPr>
-            <a:r>
-              <a:rPr lang="zh-CN" altLang="en-US" sz="2000">
-                <a:solidFill>
-                  <a:schemeClr val="bg1"/>
-                </a:solidFill>
-                <a:latin typeface="微软雅黑" charset="0"/>
-                <a:ea typeface="微软雅黑" charset="0"/>
-              </a:rPr>
-              <a:t>（游戏名未想到）</a:t>
-            </a:r>
-            <a:endParaRPr lang="zh-CN" altLang="en-US" sz="2800">
-              <a:solidFill>
-                <a:schemeClr val="bg1"/>
-              </a:solidFill>
-              <a:latin typeface="微软雅黑" charset="0"/>
-              <a:ea typeface="微软雅黑" charset="0"/>
-            </a:endParaRPr>
-          </a:p>
-          <a:p>
-            <a:pPr algn="l">
-              <a:lnSpc>
-                <a:spcPct val="100000"/>
-              </a:lnSpc>
-            </a:pPr>
-            <a:endParaRPr lang="zh-CN" altLang="en-US" sz="2800">
-              <a:solidFill>
-                <a:schemeClr val="bg1"/>
-              </a:solidFill>
-              <a:latin typeface="微软雅黑" charset="0"/>
-              <a:ea typeface="微软雅黑" charset="0"/>
-            </a:endParaRPr>
-          </a:p>
-          <a:p>
-            <a:pPr algn="l">
-              <a:lnSpc>
-                <a:spcPct val="100000"/>
-              </a:lnSpc>
-            </a:pPr>
-            <a:r>
-              <a:rPr lang="zh-CN" altLang="en-US" sz="2400">
-                <a:solidFill>
-                  <a:schemeClr val="bg1"/>
-                </a:solidFill>
-                <a:latin typeface="微软雅黑" charset="0"/>
-                <a:ea typeface="微软雅黑" charset="0"/>
-              </a:rPr>
-              <a:t>玩家可以通过建立自己的世界开始游戏，</a:t>
-            </a:r>
-            <a:endParaRPr lang="zh-CN" altLang="en-US" sz="2400">
-              <a:solidFill>
-                <a:schemeClr val="bg1"/>
-              </a:solidFill>
-              <a:latin typeface="微软雅黑" charset="0"/>
-              <a:ea typeface="微软雅黑" charset="0"/>
-            </a:endParaRPr>
-          </a:p>
-          <a:p>
-            <a:pPr algn="l">
-              <a:lnSpc>
-                <a:spcPct val="100000"/>
-              </a:lnSpc>
-            </a:pPr>
-            <a:r>
-              <a:rPr lang="zh-CN" altLang="en-US" sz="2400">
-                <a:solidFill>
-                  <a:schemeClr val="bg1"/>
-                </a:solidFill>
-                <a:latin typeface="微软雅黑" charset="0"/>
-                <a:ea typeface="微软雅黑" charset="0"/>
-              </a:rPr>
-              <a:t>暗能量会每隔一段时间降临，为了抵御暗能量的入侵，</a:t>
-            </a:r>
-            <a:endParaRPr lang="zh-CN" altLang="en-US" sz="2400">
-              <a:solidFill>
-                <a:schemeClr val="bg1"/>
-              </a:solidFill>
-              <a:latin typeface="微软雅黑" charset="0"/>
-              <a:ea typeface="微软雅黑" charset="0"/>
-            </a:endParaRPr>
-          </a:p>
-          <a:p>
-            <a:pPr algn="l">
-              <a:lnSpc>
-                <a:spcPct val="100000"/>
-              </a:lnSpc>
-            </a:pPr>
-            <a:r>
-              <a:rPr lang="zh-CN" altLang="en-US" sz="2400">
-                <a:solidFill>
-                  <a:schemeClr val="bg1"/>
-                </a:solidFill>
-                <a:latin typeface="微软雅黑" charset="0"/>
-                <a:ea typeface="微软雅黑" charset="0"/>
-              </a:rPr>
-              <a:t>所以需要积攒足够多光能量与之对抗。</a:t>
-            </a:r>
-            <a:endParaRPr lang="zh-CN" altLang="en-US" sz="2400">
-              <a:solidFill>
-                <a:schemeClr val="bg1"/>
-              </a:solidFill>
-              <a:latin typeface="微软雅黑" charset="0"/>
-              <a:ea typeface="微软雅黑" charset="0"/>
-            </a:endParaRPr>
-          </a:p>
-          <a:p>
-            <a:pPr algn="l">
-              <a:lnSpc>
-                <a:spcPct val="100000"/>
-              </a:lnSpc>
-            </a:pPr>
-            <a:r>
-              <a:rPr lang="zh-CN" altLang="en-US" sz="2400">
-                <a:solidFill>
-                  <a:schemeClr val="bg1"/>
-                </a:solidFill>
-                <a:latin typeface="微软雅黑" charset="0"/>
-                <a:ea typeface="微软雅黑" charset="0"/>
-              </a:rPr>
-              <a:t>每一次的成功都会发放</a:t>
-            </a:r>
-            <a:r>
-              <a:rPr lang="en-US" altLang="zh-CN" sz="2400">
-                <a:solidFill>
-                  <a:schemeClr val="bg1"/>
-                </a:solidFill>
-                <a:latin typeface="微软雅黑" charset="0"/>
-                <a:ea typeface="微软雅黑" charset="0"/>
-              </a:rPr>
-              <a:t>token </a:t>
-            </a:r>
-            <a:r>
-              <a:rPr lang="zh-CN" altLang="en-US" sz="2400">
-                <a:solidFill>
-                  <a:schemeClr val="bg1"/>
-                </a:solidFill>
-                <a:latin typeface="微软雅黑" charset="0"/>
-                <a:ea typeface="微软雅黑" charset="0"/>
-              </a:rPr>
-              <a:t>以及</a:t>
-            </a:r>
-            <a:r>
-              <a:rPr lang="en-US" altLang="zh-CN" sz="2400">
-                <a:solidFill>
-                  <a:schemeClr val="bg1"/>
-                </a:solidFill>
-                <a:latin typeface="微软雅黑" charset="0"/>
-                <a:ea typeface="微软雅黑" charset="0"/>
-              </a:rPr>
-              <a:t>nft</a:t>
-            </a:r>
-            <a:r>
-              <a:rPr lang="zh-CN" altLang="en-US" sz="2400">
-                <a:solidFill>
-                  <a:schemeClr val="bg1"/>
-                </a:solidFill>
-                <a:latin typeface="微软雅黑" charset="0"/>
-                <a:ea typeface="微软雅黑" charset="0"/>
-              </a:rPr>
-              <a:t>碎片给予奖励</a:t>
-            </a:r>
-            <a:endParaRPr lang="zh-CN" altLang="en-US" sz="2400">
-              <a:solidFill>
-                <a:schemeClr val="bg1"/>
-              </a:solidFill>
-              <a:latin typeface="微软雅黑" charset="0"/>
-              <a:ea typeface="微软雅黑" charset="0"/>
-            </a:endParaRPr>
-          </a:p>
-          <a:p>
-            <a:pPr algn="l">
-              <a:lnSpc>
-                <a:spcPct val="100000"/>
-              </a:lnSpc>
-            </a:pPr>
-            <a:r>
-              <a:rPr lang="zh-CN" altLang="en-US" sz="2400">
-                <a:solidFill>
-                  <a:schemeClr val="bg1"/>
-                </a:solidFill>
-                <a:latin typeface="微软雅黑" charset="0"/>
-                <a:ea typeface="微软雅黑" charset="0"/>
-              </a:rPr>
-              <a:t>如果失败，世界将奔溃。</a:t>
-            </a:r>
-            <a:endParaRPr lang="zh-CN" altLang="en-US" sz="2800">
-              <a:solidFill>
-                <a:schemeClr val="bg1"/>
-              </a:solidFill>
-              <a:latin typeface="微软雅黑" charset="0"/>
-              <a:ea typeface="微软雅黑" charset="0"/>
-            </a:endParaRPr>
-          </a:p>
-          <a:p>
-            <a:pPr algn="l">
-              <a:lnSpc>
-                <a:spcPct val="100000"/>
-              </a:lnSpc>
-            </a:pPr>
-            <a:endParaRPr lang="zh-CN" altLang="en-US" sz="2800">
-              <a:solidFill>
-                <a:schemeClr val="bg1"/>
-              </a:solidFill>
-              <a:latin typeface="微软雅黑" charset="0"/>
-              <a:ea typeface="微软雅黑" charset="0"/>
-            </a:endParaRPr>
-          </a:p>
-          <a:p>
-            <a:pPr algn="l">
-              <a:lnSpc>
-                <a:spcPct val="100000"/>
-              </a:lnSpc>
-            </a:pPr>
-            <a:r>
-              <a:rPr lang="zh-CN" altLang="en-US" sz="2800">
-                <a:solidFill>
-                  <a:schemeClr val="bg1"/>
-                </a:solidFill>
-                <a:latin typeface="微软雅黑" charset="0"/>
-                <a:ea typeface="微软雅黑" charset="0"/>
-              </a:rPr>
-              <a:t>故事的设计会经历三个阶段：</a:t>
-            </a:r>
-            <a:r>
-              <a:rPr lang="zh-CN" altLang="en-US" sz="2800">
-                <a:solidFill>
-                  <a:srgbClr val="FFFF00"/>
-                </a:solidFill>
-                <a:latin typeface="微软雅黑" charset="0"/>
-                <a:ea typeface="微软雅黑" charset="0"/>
-              </a:rPr>
-              <a:t>起源，裂变，平衡</a:t>
-            </a:r>
-            <a:endParaRPr lang="zh-CN" altLang="en-US" sz="2800">
-              <a:solidFill>
-                <a:schemeClr val="bg1"/>
-              </a:solidFill>
-              <a:latin typeface="微软雅黑" charset="0"/>
-              <a:ea typeface="微软雅黑" charset="0"/>
-            </a:endParaRPr>
-          </a:p>
-          <a:p>
-            <a:pPr algn="l">
-              <a:lnSpc>
-                <a:spcPct val="100000"/>
-              </a:lnSpc>
-            </a:pPr>
-            <a:r>
-              <a:rPr lang="zh-CN" altLang="en-US" sz="2800">
-                <a:solidFill>
-                  <a:schemeClr val="bg1"/>
-                </a:solidFill>
-                <a:latin typeface="微软雅黑" charset="0"/>
-                <a:ea typeface="微软雅黑" charset="0"/>
-              </a:rPr>
-              <a:t>（本次的开发内容为起源的一小小小小段）</a:t>
-            </a:r>
-            <a:endParaRPr lang="zh-CN" altLang="en-US" sz="2800">
               <a:solidFill>
                 <a:schemeClr val="bg1"/>
               </a:solidFill>
@@ -3393,40 +3105,16 @@
         <p:nvPr/>
       </p:nvGrpSpPr>
       <p:grpSpPr/>
-      <p:pic>
-        <p:nvPicPr>
-          <p:cNvPr id="4" name="图片 3"/>
-          <p:cNvPicPr>
-            <a:picLocks noChangeAspect="1"/>
-          </p:cNvPicPr>
+      <p:sp>
+        <p:nvSpPr>
+          <p:cNvPr id="9" name="文本框 8"/>
+          <p:cNvSpPr txBox="1"/>
           <p:nvPr/>
-        </p:nvPicPr>
-        <p:blipFill>
-          <a:blip r:embed="rId1"/>
-          <a:stretch>
-            <a:fillRect/>
-          </a:stretch>
-        </p:blipFill>
+        </p:nvSpPr>
         <p:spPr>
           <a:xfrm>
-            <a:off x="789940" y="499110"/>
-            <a:ext cx="6630035" cy="3556000"/>
-          </a:xfrm>
-          <a:prstGeom prst="rect">
-            <a:avLst/>
-          </a:prstGeom>
-        </p:spPr>
-      </p:pic>
-      <p:sp>
-        <p:nvSpPr>
-          <p:cNvPr id="6" name="文本框 5"/>
-          <p:cNvSpPr txBox="1"/>
-          <p:nvPr/>
-        </p:nvSpPr>
-        <p:spPr>
-          <a:xfrm>
-            <a:off x="8674735" y="754380"/>
-            <a:ext cx="3027680" cy="5262245"/>
+            <a:off x="5090160" y="2609215"/>
+            <a:ext cx="2011680" cy="645160"/>
           </a:xfrm>
           <a:prstGeom prst="rect">
             <a:avLst/>
@@ -3439,205 +3127,16 @@
           </a:bodyPr>
           <a:p>
             <a:r>
-              <a:rPr lang="zh-CN" altLang="en-US" sz="2800">
-                <a:solidFill>
-                  <a:schemeClr val="bg1"/>
-                </a:solidFill>
-                <a:latin typeface="微软雅黑" charset="0"/>
-                <a:ea typeface="微软雅黑" charset="0"/>
-              </a:rPr>
-              <a:t>计算下次暗能量</a:t>
-            </a:r>
-            <a:endParaRPr lang="zh-CN" altLang="en-US" sz="2800">
-              <a:solidFill>
-                <a:schemeClr val="bg1"/>
-              </a:solidFill>
-              <a:latin typeface="微软雅黑" charset="0"/>
-              <a:ea typeface="微软雅黑" charset="0"/>
-            </a:endParaRPr>
-          </a:p>
-          <a:p>
-            <a:r>
-              <a:rPr lang="zh-CN" altLang="en-US" sz="2800">
-                <a:solidFill>
-                  <a:schemeClr val="bg1"/>
-                </a:solidFill>
-                <a:latin typeface="微软雅黑" charset="0"/>
-                <a:ea typeface="微软雅黑" charset="0"/>
-              </a:rPr>
-              <a:t>来临时间以及多少</a:t>
-            </a:r>
-            <a:endParaRPr lang="zh-CN" altLang="en-US" sz="2800">
-              <a:solidFill>
-                <a:schemeClr val="bg1"/>
-              </a:solidFill>
-              <a:latin typeface="微软雅黑" charset="0"/>
-              <a:ea typeface="微软雅黑" charset="0"/>
-            </a:endParaRPr>
-          </a:p>
-          <a:p>
-            <a:r>
-              <a:rPr lang="zh-CN" altLang="en-US" sz="2800">
-                <a:solidFill>
-                  <a:schemeClr val="bg1"/>
-                </a:solidFill>
-                <a:latin typeface="微软雅黑" charset="0"/>
-                <a:ea typeface="微软雅黑" charset="0"/>
-              </a:rPr>
-              <a:t>暗物质</a:t>
-            </a:r>
-            <a:endParaRPr lang="zh-CN" altLang="en-US" sz="2800">
-              <a:solidFill>
-                <a:schemeClr val="bg1"/>
-              </a:solidFill>
-              <a:latin typeface="微软雅黑" charset="0"/>
-              <a:ea typeface="微软雅黑" charset="0"/>
-            </a:endParaRPr>
-          </a:p>
-          <a:p>
-            <a:endParaRPr lang="zh-CN" altLang="en-US" sz="2800">
-              <a:solidFill>
-                <a:schemeClr val="bg1"/>
-              </a:solidFill>
-              <a:latin typeface="微软雅黑" charset="0"/>
-              <a:ea typeface="微软雅黑" charset="0"/>
-            </a:endParaRPr>
-          </a:p>
-          <a:p>
-            <a:r>
-              <a:rPr lang="zh-CN" altLang="en-US" sz="2800">
-                <a:solidFill>
-                  <a:schemeClr val="bg1"/>
-                </a:solidFill>
-                <a:latin typeface="微软雅黑" charset="0"/>
-                <a:ea typeface="微软雅黑" charset="0"/>
-              </a:rPr>
-              <a:t>这里的计算方式</a:t>
-            </a:r>
-            <a:endParaRPr lang="zh-CN" altLang="en-US" sz="2800">
-              <a:solidFill>
-                <a:schemeClr val="bg1"/>
-              </a:solidFill>
-              <a:latin typeface="微软雅黑" charset="0"/>
-              <a:ea typeface="微软雅黑" charset="0"/>
-            </a:endParaRPr>
-          </a:p>
-          <a:p>
-            <a:r>
-              <a:rPr lang="zh-CN" altLang="en-US" sz="2800">
-                <a:solidFill>
-                  <a:schemeClr val="bg1"/>
-                </a:solidFill>
-                <a:latin typeface="微软雅黑" charset="0"/>
-                <a:ea typeface="微软雅黑" charset="0"/>
-              </a:rPr>
-              <a:t>后期希望是一个</a:t>
-            </a:r>
-            <a:endParaRPr lang="zh-CN" altLang="en-US" sz="2800">
-              <a:solidFill>
-                <a:schemeClr val="bg1"/>
-              </a:solidFill>
-              <a:latin typeface="微软雅黑" charset="0"/>
-              <a:ea typeface="微软雅黑" charset="0"/>
-            </a:endParaRPr>
-          </a:p>
-          <a:p>
-            <a:r>
-              <a:rPr lang="zh-CN" altLang="en-US" sz="2800">
-                <a:solidFill>
-                  <a:schemeClr val="bg1"/>
-                </a:solidFill>
-                <a:latin typeface="微软雅黑" charset="0"/>
-                <a:ea typeface="微软雅黑" charset="0"/>
-              </a:rPr>
-              <a:t>类似指数型增长</a:t>
-            </a:r>
-            <a:endParaRPr lang="zh-CN" altLang="en-US" sz="2800">
-              <a:solidFill>
-                <a:schemeClr val="bg1"/>
-              </a:solidFill>
-              <a:latin typeface="微软雅黑" charset="0"/>
-              <a:ea typeface="微软雅黑" charset="0"/>
-            </a:endParaRPr>
-          </a:p>
-          <a:p>
-            <a:endParaRPr lang="zh-CN" altLang="en-US" sz="2800">
-              <a:solidFill>
-                <a:schemeClr val="bg1"/>
-              </a:solidFill>
-              <a:latin typeface="微软雅黑" charset="0"/>
-              <a:ea typeface="微软雅黑" charset="0"/>
-            </a:endParaRPr>
-          </a:p>
-          <a:p>
-            <a:r>
-              <a:rPr lang="zh-CN" altLang="en-US" sz="2800">
-                <a:solidFill>
-                  <a:schemeClr val="bg1"/>
-                </a:solidFill>
-                <a:latin typeface="微软雅黑" charset="0"/>
-                <a:ea typeface="微软雅黑" charset="0"/>
-              </a:rPr>
-              <a:t>而每隔一段时间</a:t>
-            </a:r>
-            <a:endParaRPr lang="zh-CN" altLang="en-US" sz="2800">
-              <a:solidFill>
-                <a:schemeClr val="bg1"/>
-              </a:solidFill>
-              <a:latin typeface="微软雅黑" charset="0"/>
-              <a:ea typeface="微软雅黑" charset="0"/>
-            </a:endParaRPr>
-          </a:p>
-          <a:p>
-            <a:r>
-              <a:rPr lang="zh-CN" altLang="en-US" sz="2800">
-                <a:solidFill>
-                  <a:schemeClr val="bg1"/>
-                </a:solidFill>
-                <a:latin typeface="微软雅黑" charset="0"/>
-                <a:ea typeface="微软雅黑" charset="0"/>
-              </a:rPr>
-              <a:t>会有一次更大的</a:t>
-            </a:r>
-            <a:endParaRPr lang="zh-CN" altLang="en-US" sz="2800">
-              <a:solidFill>
-                <a:schemeClr val="bg1"/>
-              </a:solidFill>
-              <a:latin typeface="微软雅黑" charset="0"/>
-              <a:ea typeface="微软雅黑" charset="0"/>
-            </a:endParaRPr>
-          </a:p>
-          <a:p>
-            <a:r>
-              <a:rPr lang="zh-CN" altLang="en-US" sz="2800">
-                <a:solidFill>
-                  <a:schemeClr val="bg1"/>
-                </a:solidFill>
-                <a:latin typeface="微软雅黑" charset="0"/>
-                <a:ea typeface="微软雅黑" charset="0"/>
-              </a:rPr>
-              <a:t>积累（比如在</a:t>
-            </a:r>
-            <a:endParaRPr lang="zh-CN" altLang="en-US" sz="2800">
-              <a:solidFill>
-                <a:schemeClr val="bg1"/>
-              </a:solidFill>
-              <a:latin typeface="微软雅黑" charset="0"/>
-              <a:ea typeface="微软雅黑" charset="0"/>
-            </a:endParaRPr>
-          </a:p>
-          <a:p>
-            <a:r>
-              <a:rPr lang="zh-CN" altLang="en-US" sz="2800">
-                <a:solidFill>
-                  <a:schemeClr val="bg1"/>
-                </a:solidFill>
-                <a:latin typeface="微软雅黑" charset="0"/>
-                <a:ea typeface="微软雅黑" charset="0"/>
-              </a:rPr>
-              <a:t>月圆之夜）</a:t>
-            </a:r>
-            <a:endParaRPr lang="zh-CN" altLang="en-US" sz="2800">
+              <a:rPr lang="zh-CN" altLang="en-US" sz="3600">
+                <a:solidFill>
+                  <a:schemeClr val="bg1"/>
+                </a:solidFill>
+                <a:latin typeface="微软雅黑" charset="0"/>
+                <a:ea typeface="微软雅黑" charset="0"/>
+              </a:rPr>
+              <a:t>合约介绍</a:t>
+            </a:r>
+            <a:endParaRPr lang="zh-CN" altLang="en-US" sz="3600">
               <a:solidFill>
                 <a:schemeClr val="bg1"/>
               </a:solidFill>
@@ -3689,6 +3188,535 @@
         </p:blipFill>
         <p:spPr>
           <a:xfrm>
+            <a:off x="1451610" y="1199515"/>
+            <a:ext cx="8992235" cy="2057400"/>
+          </a:xfrm>
+          <a:prstGeom prst="rect">
+            <a:avLst/>
+          </a:prstGeom>
+        </p:spPr>
+      </p:pic>
+      <p:sp>
+        <p:nvSpPr>
+          <p:cNvPr id="6" name="文本框 5"/>
+          <p:cNvSpPr txBox="1"/>
+          <p:nvPr/>
+        </p:nvSpPr>
+        <p:spPr>
+          <a:xfrm>
+            <a:off x="1451610" y="3748405"/>
+            <a:ext cx="5480050" cy="521970"/>
+          </a:xfrm>
+          <a:prstGeom prst="rect">
+            <a:avLst/>
+          </a:prstGeom>
+          <a:noFill/>
+        </p:spPr>
+        <p:txBody>
+          <a:bodyPr wrap="none" rtlCol="0">
+            <a:spAutoFit/>
+          </a:bodyPr>
+          <a:p>
+            <a:r>
+              <a:rPr lang="zh-CN" altLang="en-US" sz="2800">
+                <a:solidFill>
+                  <a:schemeClr val="bg1"/>
+                </a:solidFill>
+                <a:latin typeface="微软雅黑" charset="0"/>
+                <a:ea typeface="微软雅黑" charset="0"/>
+              </a:rPr>
+              <a:t>每完成一次贡献，光能量就会 </a:t>
+            </a:r>
+            <a:r>
+              <a:rPr lang="en-US" altLang="zh-CN" sz="2800">
+                <a:solidFill>
+                  <a:schemeClr val="bg1"/>
+                </a:solidFill>
+                <a:latin typeface="微软雅黑" charset="0"/>
+                <a:ea typeface="微软雅黑" charset="0"/>
+              </a:rPr>
+              <a:t>+ 1</a:t>
+            </a:r>
+            <a:endParaRPr lang="en-US" altLang="zh-CN" sz="2800">
+              <a:solidFill>
+                <a:schemeClr val="bg1"/>
+              </a:solidFill>
+              <a:latin typeface="微软雅黑" charset="0"/>
+              <a:ea typeface="微软雅黑" charset="0"/>
+            </a:endParaRPr>
+          </a:p>
+        </p:txBody>
+      </p:sp>
+    </p:spTree>
+  </p:cSld>
+  <p:clrMapOvr>
+    <a:masterClrMapping/>
+  </p:clrMapOvr>
+</p:sld>
+</file>
+
+<file path=ppt/slides/slide12.xml><?xml version="1.0" encoding="utf-8"?>
+<p:sld xmlns:a="http://schemas.openxmlformats.org/drawingml/2006/main" xmlns:r="http://schemas.openxmlformats.org/officeDocument/2006/relationships" xmlns:p="http://schemas.openxmlformats.org/presentationml/2006/main">
+  <p:cSld>
+    <p:bg>
+      <p:bgPr>
+        <a:solidFill>
+          <a:schemeClr val="tx1"/>
+        </a:solidFill>
+        <a:effectLst/>
+      </p:bgPr>
+    </p:bg>
+    <p:spTree>
+      <p:nvGrpSpPr>
+        <p:cNvPr id="1" name=""/>
+        <p:cNvGrpSpPr/>
+        <p:nvPr/>
+      </p:nvGrpSpPr>
+      <p:grpSpPr/>
+      <p:pic>
+        <p:nvPicPr>
+          <p:cNvPr id="4" name="图片 3"/>
+          <p:cNvPicPr>
+            <a:picLocks noChangeAspect="1"/>
+          </p:cNvPicPr>
+          <p:nvPr/>
+        </p:nvPicPr>
+        <p:blipFill>
+          <a:blip r:embed="rId1"/>
+          <a:stretch>
+            <a:fillRect/>
+          </a:stretch>
+        </p:blipFill>
+        <p:spPr>
+          <a:xfrm>
+            <a:off x="648335" y="495300"/>
+            <a:ext cx="7734935" cy="5867400"/>
+          </a:xfrm>
+          <a:prstGeom prst="rect">
+            <a:avLst/>
+          </a:prstGeom>
+        </p:spPr>
+      </p:pic>
+      <p:sp>
+        <p:nvSpPr>
+          <p:cNvPr id="6" name="文本框 5"/>
+          <p:cNvSpPr txBox="1"/>
+          <p:nvPr/>
+        </p:nvSpPr>
+        <p:spPr>
+          <a:xfrm>
+            <a:off x="8674735" y="754380"/>
+            <a:ext cx="3027680" cy="1814830"/>
+          </a:xfrm>
+          <a:prstGeom prst="rect">
+            <a:avLst/>
+          </a:prstGeom>
+          <a:noFill/>
+        </p:spPr>
+        <p:txBody>
+          <a:bodyPr wrap="none" rtlCol="0">
+            <a:spAutoFit/>
+          </a:bodyPr>
+          <a:p>
+            <a:r>
+              <a:rPr lang="zh-CN" altLang="en-US" sz="2800">
+                <a:solidFill>
+                  <a:schemeClr val="bg1"/>
+                </a:solidFill>
+                <a:latin typeface="微软雅黑" charset="0"/>
+                <a:ea typeface="微软雅黑" charset="0"/>
+              </a:rPr>
+              <a:t>每天会进行同步</a:t>
+            </a:r>
+            <a:endParaRPr lang="zh-CN" altLang="en-US" sz="2800">
+              <a:solidFill>
+                <a:schemeClr val="bg1"/>
+              </a:solidFill>
+              <a:latin typeface="微软雅黑" charset="0"/>
+              <a:ea typeface="微软雅黑" charset="0"/>
+            </a:endParaRPr>
+          </a:p>
+          <a:p>
+            <a:r>
+              <a:rPr lang="zh-CN" altLang="en-US" sz="2800">
+                <a:solidFill>
+                  <a:schemeClr val="bg1"/>
+                </a:solidFill>
+                <a:latin typeface="微软雅黑" charset="0"/>
+                <a:ea typeface="微软雅黑" charset="0"/>
+              </a:rPr>
+              <a:t>数据确定剩余能量</a:t>
+            </a:r>
+            <a:endParaRPr lang="zh-CN" altLang="en-US" sz="2800">
+              <a:solidFill>
+                <a:schemeClr val="bg1"/>
+              </a:solidFill>
+              <a:latin typeface="微软雅黑" charset="0"/>
+              <a:ea typeface="微软雅黑" charset="0"/>
+            </a:endParaRPr>
+          </a:p>
+          <a:p>
+            <a:r>
+              <a:rPr lang="zh-CN" altLang="en-US" sz="2800">
+                <a:solidFill>
+                  <a:schemeClr val="bg1"/>
+                </a:solidFill>
+                <a:latin typeface="微软雅黑" charset="0"/>
+                <a:ea typeface="微软雅黑" charset="0"/>
+              </a:rPr>
+              <a:t>还需要多少以及当</a:t>
+            </a:r>
+            <a:endParaRPr lang="zh-CN" altLang="en-US" sz="2800">
+              <a:solidFill>
+                <a:schemeClr val="bg1"/>
+              </a:solidFill>
+              <a:latin typeface="微软雅黑" charset="0"/>
+              <a:ea typeface="微软雅黑" charset="0"/>
+            </a:endParaRPr>
+          </a:p>
+          <a:p>
+            <a:r>
+              <a:rPr lang="zh-CN" altLang="en-US" sz="2800">
+                <a:solidFill>
+                  <a:schemeClr val="bg1"/>
+                </a:solidFill>
+                <a:latin typeface="微软雅黑" charset="0"/>
+                <a:ea typeface="微软雅黑" charset="0"/>
+              </a:rPr>
+              <a:t>天计算结果</a:t>
+            </a:r>
+            <a:endParaRPr lang="zh-CN" altLang="en-US" sz="2800">
+              <a:solidFill>
+                <a:schemeClr val="bg1"/>
+              </a:solidFill>
+              <a:latin typeface="微软雅黑" charset="0"/>
+              <a:ea typeface="微软雅黑" charset="0"/>
+            </a:endParaRPr>
+          </a:p>
+        </p:txBody>
+      </p:sp>
+    </p:spTree>
+  </p:cSld>
+  <p:clrMapOvr>
+    <a:masterClrMapping/>
+  </p:clrMapOvr>
+</p:sld>
+</file>
+
+<file path=ppt/slides/slide13.xml><?xml version="1.0" encoding="utf-8"?>
+<p:sld xmlns:a="http://schemas.openxmlformats.org/drawingml/2006/main" xmlns:r="http://schemas.openxmlformats.org/officeDocument/2006/relationships" xmlns:p="http://schemas.openxmlformats.org/presentationml/2006/main">
+  <p:cSld>
+    <p:bg>
+      <p:bgPr>
+        <a:solidFill>
+          <a:schemeClr val="tx1"/>
+        </a:solidFill>
+        <a:effectLst/>
+      </p:bgPr>
+    </p:bg>
+    <p:spTree>
+      <p:nvGrpSpPr>
+        <p:cNvPr id="1" name=""/>
+        <p:cNvGrpSpPr/>
+        <p:nvPr/>
+      </p:nvGrpSpPr>
+      <p:grpSpPr/>
+      <p:pic>
+        <p:nvPicPr>
+          <p:cNvPr id="4" name="图片 3"/>
+          <p:cNvPicPr>
+            <a:picLocks noChangeAspect="1"/>
+          </p:cNvPicPr>
+          <p:nvPr/>
+        </p:nvPicPr>
+        <p:blipFill>
+          <a:blip r:embed="rId1"/>
+          <a:stretch>
+            <a:fillRect/>
+          </a:stretch>
+        </p:blipFill>
+        <p:spPr>
+          <a:xfrm>
+            <a:off x="789940" y="499110"/>
+            <a:ext cx="6630035" cy="3556000"/>
+          </a:xfrm>
+          <a:prstGeom prst="rect">
+            <a:avLst/>
+          </a:prstGeom>
+        </p:spPr>
+      </p:pic>
+      <p:sp>
+        <p:nvSpPr>
+          <p:cNvPr id="6" name="文本框 5"/>
+          <p:cNvSpPr txBox="1"/>
+          <p:nvPr/>
+        </p:nvSpPr>
+        <p:spPr>
+          <a:xfrm>
+            <a:off x="8674735" y="754380"/>
+            <a:ext cx="3027680" cy="5262245"/>
+          </a:xfrm>
+          <a:prstGeom prst="rect">
+            <a:avLst/>
+          </a:prstGeom>
+          <a:noFill/>
+        </p:spPr>
+        <p:txBody>
+          <a:bodyPr wrap="none" rtlCol="0">
+            <a:spAutoFit/>
+          </a:bodyPr>
+          <a:p>
+            <a:r>
+              <a:rPr lang="zh-CN" altLang="en-US" sz="2800">
+                <a:solidFill>
+                  <a:schemeClr val="bg1"/>
+                </a:solidFill>
+                <a:latin typeface="微软雅黑" charset="0"/>
+                <a:ea typeface="微软雅黑" charset="0"/>
+              </a:rPr>
+              <a:t>计算下次暗能量</a:t>
+            </a:r>
+            <a:endParaRPr lang="zh-CN" altLang="en-US" sz="2800">
+              <a:solidFill>
+                <a:schemeClr val="bg1"/>
+              </a:solidFill>
+              <a:latin typeface="微软雅黑" charset="0"/>
+              <a:ea typeface="微软雅黑" charset="0"/>
+            </a:endParaRPr>
+          </a:p>
+          <a:p>
+            <a:r>
+              <a:rPr lang="zh-CN" altLang="en-US" sz="2800">
+                <a:solidFill>
+                  <a:schemeClr val="bg1"/>
+                </a:solidFill>
+                <a:latin typeface="微软雅黑" charset="0"/>
+                <a:ea typeface="微软雅黑" charset="0"/>
+              </a:rPr>
+              <a:t>来临时间以及多少</a:t>
+            </a:r>
+            <a:endParaRPr lang="zh-CN" altLang="en-US" sz="2800">
+              <a:solidFill>
+                <a:schemeClr val="bg1"/>
+              </a:solidFill>
+              <a:latin typeface="微软雅黑" charset="0"/>
+              <a:ea typeface="微软雅黑" charset="0"/>
+            </a:endParaRPr>
+          </a:p>
+          <a:p>
+            <a:r>
+              <a:rPr lang="zh-CN" altLang="en-US" sz="2800">
+                <a:solidFill>
+                  <a:schemeClr val="bg1"/>
+                </a:solidFill>
+                <a:latin typeface="微软雅黑" charset="0"/>
+                <a:ea typeface="微软雅黑" charset="0"/>
+              </a:rPr>
+              <a:t>暗物质</a:t>
+            </a:r>
+            <a:endParaRPr lang="zh-CN" altLang="en-US" sz="2800">
+              <a:solidFill>
+                <a:schemeClr val="bg1"/>
+              </a:solidFill>
+              <a:latin typeface="微软雅黑" charset="0"/>
+              <a:ea typeface="微软雅黑" charset="0"/>
+            </a:endParaRPr>
+          </a:p>
+          <a:p>
+            <a:endParaRPr lang="zh-CN" altLang="en-US" sz="2800">
+              <a:solidFill>
+                <a:schemeClr val="bg1"/>
+              </a:solidFill>
+              <a:latin typeface="微软雅黑" charset="0"/>
+              <a:ea typeface="微软雅黑" charset="0"/>
+            </a:endParaRPr>
+          </a:p>
+          <a:p>
+            <a:r>
+              <a:rPr lang="zh-CN" altLang="en-US" sz="2800">
+                <a:solidFill>
+                  <a:schemeClr val="bg1"/>
+                </a:solidFill>
+                <a:latin typeface="微软雅黑" charset="0"/>
+                <a:ea typeface="微软雅黑" charset="0"/>
+              </a:rPr>
+              <a:t>这里的计算方式</a:t>
+            </a:r>
+            <a:endParaRPr lang="zh-CN" altLang="en-US" sz="2800">
+              <a:solidFill>
+                <a:schemeClr val="bg1"/>
+              </a:solidFill>
+              <a:latin typeface="微软雅黑" charset="0"/>
+              <a:ea typeface="微软雅黑" charset="0"/>
+            </a:endParaRPr>
+          </a:p>
+          <a:p>
+            <a:r>
+              <a:rPr lang="zh-CN" altLang="en-US" sz="2800">
+                <a:solidFill>
+                  <a:schemeClr val="bg1"/>
+                </a:solidFill>
+                <a:latin typeface="微软雅黑" charset="0"/>
+                <a:ea typeface="微软雅黑" charset="0"/>
+              </a:rPr>
+              <a:t>后期希望是一个</a:t>
+            </a:r>
+            <a:endParaRPr lang="zh-CN" altLang="en-US" sz="2800">
+              <a:solidFill>
+                <a:schemeClr val="bg1"/>
+              </a:solidFill>
+              <a:latin typeface="微软雅黑" charset="0"/>
+              <a:ea typeface="微软雅黑" charset="0"/>
+            </a:endParaRPr>
+          </a:p>
+          <a:p>
+            <a:r>
+              <a:rPr lang="zh-CN" altLang="en-US" sz="2800">
+                <a:solidFill>
+                  <a:schemeClr val="bg1"/>
+                </a:solidFill>
+                <a:latin typeface="微软雅黑" charset="0"/>
+                <a:ea typeface="微软雅黑" charset="0"/>
+              </a:rPr>
+              <a:t>类似指数型增长</a:t>
+            </a:r>
+            <a:endParaRPr lang="zh-CN" altLang="en-US" sz="2800">
+              <a:solidFill>
+                <a:schemeClr val="bg1"/>
+              </a:solidFill>
+              <a:latin typeface="微软雅黑" charset="0"/>
+              <a:ea typeface="微软雅黑" charset="0"/>
+            </a:endParaRPr>
+          </a:p>
+          <a:p>
+            <a:endParaRPr lang="zh-CN" altLang="en-US" sz="2800">
+              <a:solidFill>
+                <a:schemeClr val="bg1"/>
+              </a:solidFill>
+              <a:latin typeface="微软雅黑" charset="0"/>
+              <a:ea typeface="微软雅黑" charset="0"/>
+            </a:endParaRPr>
+          </a:p>
+          <a:p>
+            <a:r>
+              <a:rPr lang="zh-CN" altLang="en-US" sz="2800">
+                <a:solidFill>
+                  <a:schemeClr val="bg1"/>
+                </a:solidFill>
+                <a:latin typeface="微软雅黑" charset="0"/>
+                <a:ea typeface="微软雅黑" charset="0"/>
+              </a:rPr>
+              <a:t>而每隔一段时间</a:t>
+            </a:r>
+            <a:endParaRPr lang="zh-CN" altLang="en-US" sz="2800">
+              <a:solidFill>
+                <a:schemeClr val="bg1"/>
+              </a:solidFill>
+              <a:latin typeface="微软雅黑" charset="0"/>
+              <a:ea typeface="微软雅黑" charset="0"/>
+            </a:endParaRPr>
+          </a:p>
+          <a:p>
+            <a:r>
+              <a:rPr lang="zh-CN" altLang="en-US" sz="2800">
+                <a:solidFill>
+                  <a:schemeClr val="bg1"/>
+                </a:solidFill>
+                <a:latin typeface="微软雅黑" charset="0"/>
+                <a:ea typeface="微软雅黑" charset="0"/>
+              </a:rPr>
+              <a:t>会有一次更大的</a:t>
+            </a:r>
+            <a:endParaRPr lang="zh-CN" altLang="en-US" sz="2800">
+              <a:solidFill>
+                <a:schemeClr val="bg1"/>
+              </a:solidFill>
+              <a:latin typeface="微软雅黑" charset="0"/>
+              <a:ea typeface="微软雅黑" charset="0"/>
+            </a:endParaRPr>
+          </a:p>
+          <a:p>
+            <a:r>
+              <a:rPr lang="zh-CN" altLang="en-US" sz="2800">
+                <a:solidFill>
+                  <a:schemeClr val="bg1"/>
+                </a:solidFill>
+                <a:latin typeface="微软雅黑" charset="0"/>
+                <a:ea typeface="微软雅黑" charset="0"/>
+              </a:rPr>
+              <a:t>积累（比如在</a:t>
+            </a:r>
+            <a:endParaRPr lang="zh-CN" altLang="en-US" sz="2800">
+              <a:solidFill>
+                <a:schemeClr val="bg1"/>
+              </a:solidFill>
+              <a:latin typeface="微软雅黑" charset="0"/>
+              <a:ea typeface="微软雅黑" charset="0"/>
+            </a:endParaRPr>
+          </a:p>
+          <a:p>
+            <a:r>
+              <a:rPr lang="zh-CN" altLang="en-US" sz="2800">
+                <a:solidFill>
+                  <a:schemeClr val="bg1"/>
+                </a:solidFill>
+                <a:latin typeface="微软雅黑" charset="0"/>
+                <a:ea typeface="微软雅黑" charset="0"/>
+              </a:rPr>
+              <a:t>月圆之夜）</a:t>
+            </a:r>
+            <a:endParaRPr lang="zh-CN" altLang="en-US" sz="2800">
+              <a:solidFill>
+                <a:schemeClr val="bg1"/>
+              </a:solidFill>
+              <a:latin typeface="微软雅黑" charset="0"/>
+              <a:ea typeface="微软雅黑" charset="0"/>
+            </a:endParaRPr>
+          </a:p>
+        </p:txBody>
+      </p:sp>
+    </p:spTree>
+  </p:cSld>
+  <p:clrMapOvr>
+    <a:masterClrMapping/>
+  </p:clrMapOvr>
+</p:sld>
+</file>
+
+<file path=ppt/slides/slide14.xml><?xml version="1.0" encoding="utf-8"?>
+<p:sld xmlns:a="http://schemas.openxmlformats.org/drawingml/2006/main" xmlns:r="http://schemas.openxmlformats.org/officeDocument/2006/relationships" xmlns:p="http://schemas.openxmlformats.org/presentationml/2006/main">
+  <p:cSld>
+    <p:bg>
+      <p:bgPr>
+        <a:solidFill>
+          <a:schemeClr val="tx1"/>
+        </a:solidFill>
+        <a:effectLst/>
+      </p:bgPr>
+    </p:bg>
+    <p:spTree>
+      <p:nvGrpSpPr>
+        <p:cNvPr id="1" name=""/>
+        <p:cNvGrpSpPr/>
+        <p:nvPr/>
+      </p:nvGrpSpPr>
+      <p:grpSpPr/>
+      <p:pic>
+        <p:nvPicPr>
+          <p:cNvPr id="4" name="图片 3"/>
+          <p:cNvPicPr>
+            <a:picLocks noChangeAspect="1"/>
+          </p:cNvPicPr>
+          <p:nvPr/>
+        </p:nvPicPr>
+        <p:blipFill>
+          <a:blip r:embed="rId1"/>
+          <a:stretch>
+            <a:fillRect/>
+          </a:stretch>
+        </p:blipFill>
+        <p:spPr>
+          <a:xfrm>
             <a:off x="1453515" y="551815"/>
             <a:ext cx="9284335" cy="3352800"/>
           </a:xfrm>
@@ -3901,7 +3929,7 @@
 </p:sld>
 </file>
 
-<file path=ppt/slides/slide12.xml><?xml version="1.0" encoding="utf-8"?>
+<file path=ppt/slides/slide15.xml><?xml version="1.0" encoding="utf-8"?>
 <p:sld xmlns:a="http://schemas.openxmlformats.org/drawingml/2006/main" xmlns:r="http://schemas.openxmlformats.org/officeDocument/2006/relationships" xmlns:p="http://schemas.openxmlformats.org/presentationml/2006/main">
   <p:cSld>
     <p:bg>
@@ -3951,7 +3979,249 @@
 </p:sld>
 </file>
 
-<file path=ppt/slides/slide13.xml><?xml version="1.0" encoding="utf-8"?>
+<file path=ppt/slides/slide16.xml><?xml version="1.0" encoding="utf-8"?>
+<p:sld xmlns:a="http://schemas.openxmlformats.org/drawingml/2006/main" xmlns:r="http://schemas.openxmlformats.org/officeDocument/2006/relationships" xmlns:p="http://schemas.openxmlformats.org/presentationml/2006/main">
+  <p:cSld>
+    <p:bg>
+      <p:bgPr>
+        <a:solidFill>
+          <a:schemeClr val="tx1"/>
+        </a:solidFill>
+        <a:effectLst/>
+      </p:bgPr>
+    </p:bg>
+    <p:spTree>
+      <p:nvGrpSpPr>
+        <p:cNvPr id="1" name=""/>
+        <p:cNvGrpSpPr/>
+        <p:nvPr/>
+      </p:nvGrpSpPr>
+      <p:grpSpPr/>
+      <p:sp>
+        <p:nvSpPr>
+          <p:cNvPr id="4" name="文本框 3"/>
+          <p:cNvSpPr txBox="1"/>
+          <p:nvPr/>
+        </p:nvSpPr>
+        <p:spPr>
+          <a:xfrm>
+            <a:off x="717550" y="1067435"/>
+            <a:ext cx="9123680" cy="4030980"/>
+          </a:xfrm>
+          <a:prstGeom prst="rect">
+            <a:avLst/>
+          </a:prstGeom>
+          <a:noFill/>
+        </p:spPr>
+        <p:txBody>
+          <a:bodyPr wrap="none" rtlCol="0">
+            <a:spAutoFit/>
+          </a:bodyPr>
+          <a:p>
+            <a:pPr algn="l"/>
+            <a:r>
+              <a:rPr lang="zh-CN" altLang="en-US" sz="3200">
+                <a:solidFill>
+                  <a:schemeClr val="bg1"/>
+                </a:solidFill>
+                <a:latin typeface="微软雅黑" charset="0"/>
+                <a:ea typeface="微软雅黑" charset="0"/>
+                <a:sym typeface="+mn-ea"/>
+              </a:rPr>
+              <a:t>本质：</a:t>
+            </a:r>
+            <a:endParaRPr lang="zh-CN" altLang="en-US" sz="3200">
+              <a:solidFill>
+                <a:schemeClr val="bg1"/>
+              </a:solidFill>
+              <a:latin typeface="微软雅黑" charset="0"/>
+              <a:ea typeface="微软雅黑" charset="0"/>
+              <a:sym typeface="+mn-ea"/>
+            </a:endParaRPr>
+          </a:p>
+          <a:p>
+            <a:pPr algn="l"/>
+            <a:endParaRPr lang="zh-CN" altLang="en-US" sz="3200">
+              <a:solidFill>
+                <a:schemeClr val="bg1"/>
+              </a:solidFill>
+              <a:latin typeface="微软雅黑" charset="0"/>
+              <a:ea typeface="微软雅黑" charset="0"/>
+              <a:sym typeface="+mn-ea"/>
+            </a:endParaRPr>
+          </a:p>
+          <a:p>
+            <a:pPr algn="l"/>
+            <a:r>
+              <a:rPr lang="zh-CN" altLang="en-US" sz="3200">
+                <a:solidFill>
+                  <a:schemeClr val="bg1"/>
+                </a:solidFill>
+                <a:latin typeface="微软雅黑" charset="0"/>
+                <a:ea typeface="微软雅黑" charset="0"/>
+                <a:sym typeface="+mn-ea"/>
+              </a:rPr>
+              <a:t>分布式协作的打卡游戏（最小单元），</a:t>
+            </a:r>
+            <a:endParaRPr lang="zh-CN" altLang="en-US" sz="3200">
+              <a:solidFill>
+                <a:schemeClr val="bg1"/>
+              </a:solidFill>
+              <a:latin typeface="微软雅黑" charset="0"/>
+              <a:ea typeface="微软雅黑" charset="0"/>
+              <a:sym typeface="+mn-ea"/>
+            </a:endParaRPr>
+          </a:p>
+          <a:p>
+            <a:pPr algn="l"/>
+            <a:r>
+              <a:rPr lang="zh-CN" altLang="en-US" sz="3200">
+                <a:solidFill>
+                  <a:schemeClr val="bg1"/>
+                </a:solidFill>
+                <a:latin typeface="微软雅黑" charset="0"/>
+                <a:ea typeface="微软雅黑" charset="0"/>
+                <a:sym typeface="+mn-ea"/>
+              </a:rPr>
+              <a:t>一方面通过多远协作维持这个游戏成为</a:t>
+            </a:r>
+            <a:r>
+              <a:rPr lang="zh-CN" altLang="en-US" sz="3200">
+                <a:solidFill>
+                  <a:srgbClr val="FFFF00"/>
+                </a:solidFill>
+                <a:latin typeface="微软雅黑" charset="0"/>
+                <a:ea typeface="微软雅黑" charset="0"/>
+                <a:sym typeface="+mn-ea"/>
+              </a:rPr>
+              <a:t>无限游戏</a:t>
+            </a:r>
+            <a:r>
+              <a:rPr lang="zh-CN" altLang="en-US" sz="3200">
+                <a:solidFill>
+                  <a:schemeClr val="bg1"/>
+                </a:solidFill>
+                <a:latin typeface="微软雅黑" charset="0"/>
+                <a:ea typeface="微软雅黑" charset="0"/>
+                <a:sym typeface="+mn-ea"/>
+              </a:rPr>
+              <a:t>，</a:t>
+            </a:r>
+            <a:endParaRPr lang="zh-CN" altLang="en-US" sz="3200">
+              <a:solidFill>
+                <a:schemeClr val="bg1"/>
+              </a:solidFill>
+              <a:latin typeface="微软雅黑" charset="0"/>
+              <a:ea typeface="微软雅黑" charset="0"/>
+            </a:endParaRPr>
+          </a:p>
+          <a:p>
+            <a:pPr algn="l"/>
+            <a:r>
+              <a:rPr lang="zh-CN" altLang="en-US" sz="3200">
+                <a:solidFill>
+                  <a:schemeClr val="bg1"/>
+                </a:solidFill>
+                <a:latin typeface="微软雅黑" charset="0"/>
+                <a:ea typeface="微软雅黑" charset="0"/>
+                <a:sym typeface="+mn-ea"/>
+              </a:rPr>
+              <a:t>另一方方面以算法为基础的暗物质提供了游戏的公</a:t>
+            </a:r>
+            <a:endParaRPr lang="zh-CN" altLang="en-US" sz="3200">
+              <a:solidFill>
+                <a:schemeClr val="bg1"/>
+              </a:solidFill>
+              <a:latin typeface="微软雅黑" charset="0"/>
+              <a:ea typeface="微软雅黑" charset="0"/>
+              <a:sym typeface="+mn-ea"/>
+            </a:endParaRPr>
+          </a:p>
+          <a:p>
+            <a:pPr algn="l"/>
+            <a:r>
+              <a:rPr lang="zh-CN" altLang="en-US" sz="3200">
+                <a:solidFill>
+                  <a:schemeClr val="bg1"/>
+                </a:solidFill>
+                <a:latin typeface="微软雅黑" charset="0"/>
+                <a:ea typeface="微软雅黑" charset="0"/>
+                <a:sym typeface="+mn-ea"/>
+              </a:rPr>
+              <a:t>平性和透明性，形成</a:t>
+            </a:r>
+            <a:r>
+              <a:rPr lang="zh-CN" altLang="en-US" sz="3200">
+                <a:solidFill>
+                  <a:srgbClr val="FFFF00"/>
+                </a:solidFill>
+                <a:latin typeface="微软雅黑" charset="0"/>
+                <a:ea typeface="微软雅黑" charset="0"/>
+                <a:sym typeface="+mn-ea"/>
+              </a:rPr>
+              <a:t>人机对决</a:t>
+            </a:r>
+            <a:r>
+              <a:rPr lang="zh-CN" altLang="en-US" sz="3200">
+                <a:solidFill>
+                  <a:schemeClr val="bg1"/>
+                </a:solidFill>
+                <a:latin typeface="微软雅黑" charset="0"/>
+                <a:ea typeface="微软雅黑" charset="0"/>
+                <a:sym typeface="+mn-ea"/>
+              </a:rPr>
+              <a:t>。</a:t>
+            </a:r>
+            <a:endParaRPr lang="zh-CN" altLang="en-US" sz="3200">
+              <a:solidFill>
+                <a:schemeClr val="bg1"/>
+              </a:solidFill>
+              <a:latin typeface="微软雅黑" charset="0"/>
+              <a:ea typeface="微软雅黑" charset="0"/>
+              <a:sym typeface="+mn-ea"/>
+            </a:endParaRPr>
+          </a:p>
+          <a:p>
+            <a:pPr algn="l"/>
+            <a:r>
+              <a:rPr lang="zh-CN" altLang="en-US" sz="3200">
+                <a:solidFill>
+                  <a:schemeClr val="bg1"/>
+                </a:solidFill>
+                <a:latin typeface="微软雅黑" charset="0"/>
+                <a:ea typeface="微软雅黑" charset="0"/>
+                <a:sym typeface="+mn-ea"/>
+              </a:rPr>
+              <a:t>通过以最小单元为基础再去构建上层建筑。</a:t>
+            </a:r>
+            <a:endParaRPr lang="zh-CN" altLang="en-US" sz="3200">
+              <a:solidFill>
+                <a:schemeClr val="bg1"/>
+              </a:solidFill>
+              <a:latin typeface="微软雅黑" charset="0"/>
+              <a:ea typeface="微软雅黑" charset="0"/>
+            </a:endParaRPr>
+          </a:p>
+          <a:p>
+            <a:endParaRPr lang="zh-CN" altLang="en-US" sz="3200">
+              <a:solidFill>
+                <a:schemeClr val="bg1"/>
+              </a:solidFill>
+              <a:latin typeface="微软雅黑" charset="0"/>
+              <a:ea typeface="微软雅黑" charset="0"/>
+            </a:endParaRPr>
+          </a:p>
+        </p:txBody>
+      </p:sp>
+    </p:spTree>
+  </p:cSld>
+  <p:clrMapOvr>
+    <a:masterClrMapping/>
+  </p:clrMapOvr>
+</p:sld>
+</file>
+
+<file path=ppt/slides/slide17.xml><?xml version="1.0" encoding="utf-8"?>
 <p:sld xmlns:a="http://schemas.openxmlformats.org/drawingml/2006/main" xmlns:r="http://schemas.openxmlformats.org/officeDocument/2006/relationships" xmlns:p="http://schemas.openxmlformats.org/presentationml/2006/main">
   <p:cSld>
     <p:bg>
@@ -4122,14 +4392,14 @@
       <p:grpSpPr/>
       <p:sp>
         <p:nvSpPr>
-          <p:cNvPr id="4" name="文本框 3"/>
+          <p:cNvPr id="2" name="文本框 1"/>
           <p:cNvSpPr txBox="1"/>
           <p:nvPr/>
         </p:nvSpPr>
         <p:spPr>
           <a:xfrm>
-            <a:off x="706755" y="655955"/>
-            <a:ext cx="1097280" cy="645160"/>
+            <a:off x="567055" y="1297305"/>
+            <a:ext cx="7650480" cy="3661410"/>
           </a:xfrm>
           <a:prstGeom prst="rect">
             <a:avLst/>
@@ -4141,47 +4411,299 @@
             <a:spAutoFit/>
           </a:bodyPr>
           <a:p>
-            <a:r>
-              <a:rPr lang="zh-CN" altLang="en-US" sz="3600">
-                <a:solidFill>
-                  <a:schemeClr val="bg1"/>
-                </a:solidFill>
-                <a:latin typeface="微软雅黑" charset="0"/>
-                <a:ea typeface="微软雅黑" charset="0"/>
-              </a:rPr>
-              <a:t>起源</a:t>
-            </a:r>
-            <a:endParaRPr lang="zh-CN" altLang="en-US" sz="3600">
-              <a:solidFill>
-                <a:schemeClr val="bg1"/>
-              </a:solidFill>
-              <a:latin typeface="微软雅黑" charset="0"/>
-              <a:ea typeface="微软雅黑" charset="0"/>
-            </a:endParaRPr>
-          </a:p>
-        </p:txBody>
-      </p:sp>
-      <p:sp>
-        <p:nvSpPr>
-          <p:cNvPr id="6" name="文本框 5"/>
-          <p:cNvSpPr txBox="1"/>
-          <p:nvPr/>
-        </p:nvSpPr>
-        <p:spPr>
-          <a:xfrm>
-            <a:off x="706755" y="1593215"/>
-            <a:ext cx="9159875" cy="1814830"/>
-          </a:xfrm>
-          <a:prstGeom prst="rect">
-            <a:avLst/>
-          </a:prstGeom>
-          <a:noFill/>
-        </p:spPr>
-        <p:txBody>
-          <a:bodyPr wrap="none" rtlCol="0">
-            <a:spAutoFit/>
-          </a:bodyPr>
-          <a:p>
+            <a:pPr algn="l">
+              <a:lnSpc>
+                <a:spcPct val="100000"/>
+              </a:lnSpc>
+            </a:pPr>
+            <a:endParaRPr lang="zh-CN" altLang="en-US" sz="2800">
+              <a:solidFill>
+                <a:schemeClr val="bg1"/>
+              </a:solidFill>
+              <a:latin typeface="微软雅黑" charset="0"/>
+              <a:ea typeface="微软雅黑" charset="0"/>
+            </a:endParaRPr>
+          </a:p>
+          <a:p>
+            <a:pPr algn="l">
+              <a:lnSpc>
+                <a:spcPct val="100000"/>
+              </a:lnSpc>
+            </a:pPr>
+            <a:r>
+              <a:rPr lang="zh-CN" altLang="en-US" sz="2400">
+                <a:solidFill>
+                  <a:schemeClr val="bg1"/>
+                </a:solidFill>
+                <a:latin typeface="微软雅黑" charset="0"/>
+                <a:ea typeface="微软雅黑" charset="0"/>
+              </a:rPr>
+              <a:t>玩家可以通过建立自己的世界开始游戏，</a:t>
+            </a:r>
+            <a:endParaRPr lang="zh-CN" altLang="en-US" sz="2400">
+              <a:solidFill>
+                <a:schemeClr val="bg1"/>
+              </a:solidFill>
+              <a:latin typeface="微软雅黑" charset="0"/>
+              <a:ea typeface="微软雅黑" charset="0"/>
+            </a:endParaRPr>
+          </a:p>
+          <a:p>
+            <a:pPr algn="l">
+              <a:lnSpc>
+                <a:spcPct val="100000"/>
+              </a:lnSpc>
+            </a:pPr>
+            <a:r>
+              <a:rPr lang="zh-CN" altLang="en-US" sz="2400">
+                <a:solidFill>
+                  <a:schemeClr val="bg1"/>
+                </a:solidFill>
+                <a:latin typeface="微软雅黑" charset="0"/>
+                <a:ea typeface="微软雅黑" charset="0"/>
+              </a:rPr>
+              <a:t>暗能量会</a:t>
+            </a:r>
+            <a:r>
+              <a:rPr lang="zh-CN" altLang="en-US" sz="2400">
+                <a:solidFill>
+                  <a:srgbClr val="FF0000"/>
+                </a:solidFill>
+                <a:latin typeface="微软雅黑" charset="0"/>
+                <a:ea typeface="微软雅黑" charset="0"/>
+              </a:rPr>
+              <a:t>每隔一段时间</a:t>
+            </a:r>
+            <a:r>
+              <a:rPr lang="zh-CN" altLang="en-US" sz="2400">
+                <a:solidFill>
+                  <a:schemeClr val="bg1"/>
+                </a:solidFill>
+                <a:latin typeface="微软雅黑" charset="0"/>
+                <a:ea typeface="微软雅黑" charset="0"/>
+              </a:rPr>
+              <a:t>降临，为了抵御暗能量的入侵，</a:t>
+            </a:r>
+            <a:endParaRPr lang="zh-CN" altLang="en-US" sz="2400">
+              <a:solidFill>
+                <a:schemeClr val="bg1"/>
+              </a:solidFill>
+              <a:latin typeface="微软雅黑" charset="0"/>
+              <a:ea typeface="微软雅黑" charset="0"/>
+            </a:endParaRPr>
+          </a:p>
+          <a:p>
+            <a:pPr algn="l">
+              <a:lnSpc>
+                <a:spcPct val="100000"/>
+              </a:lnSpc>
+            </a:pPr>
+            <a:r>
+              <a:rPr lang="zh-CN" altLang="en-US" sz="2400">
+                <a:solidFill>
+                  <a:schemeClr val="bg1"/>
+                </a:solidFill>
+                <a:latin typeface="微软雅黑" charset="0"/>
+                <a:ea typeface="微软雅黑" charset="0"/>
+              </a:rPr>
+              <a:t>所以需要积攒</a:t>
+            </a:r>
+            <a:r>
+              <a:rPr lang="zh-CN" altLang="en-US" sz="2400">
+                <a:solidFill>
+                  <a:srgbClr val="FF0000"/>
+                </a:solidFill>
+                <a:latin typeface="微软雅黑" charset="0"/>
+                <a:ea typeface="微软雅黑" charset="0"/>
+              </a:rPr>
+              <a:t>足够多光能量</a:t>
+            </a:r>
+            <a:r>
+              <a:rPr lang="en-US" altLang="zh-CN" sz="2400">
+                <a:solidFill>
+                  <a:srgbClr val="FF0000"/>
+                </a:solidFill>
+                <a:latin typeface="微软雅黑" charset="0"/>
+                <a:ea typeface="微软雅黑" charset="0"/>
+              </a:rPr>
+              <a:t>(&gt;=</a:t>
+            </a:r>
+            <a:r>
+              <a:rPr lang="zh-CN" altLang="en-US" sz="2400">
+                <a:solidFill>
+                  <a:srgbClr val="FF0000"/>
+                </a:solidFill>
+                <a:latin typeface="微软雅黑" charset="0"/>
+                <a:ea typeface="微软雅黑" charset="0"/>
+              </a:rPr>
+              <a:t>暗物质量</a:t>
+            </a:r>
+            <a:r>
+              <a:rPr lang="en-US" altLang="zh-CN" sz="2400">
+                <a:solidFill>
+                  <a:srgbClr val="FF0000"/>
+                </a:solidFill>
+                <a:latin typeface="微软雅黑" charset="0"/>
+                <a:ea typeface="微软雅黑" charset="0"/>
+              </a:rPr>
+              <a:t>)</a:t>
+            </a:r>
+            <a:r>
+              <a:rPr lang="zh-CN" altLang="en-US" sz="2400">
+                <a:solidFill>
+                  <a:schemeClr val="bg1"/>
+                </a:solidFill>
+                <a:latin typeface="微软雅黑" charset="0"/>
+                <a:ea typeface="微软雅黑" charset="0"/>
+              </a:rPr>
+              <a:t>与之对抗。</a:t>
+            </a:r>
+            <a:endParaRPr lang="zh-CN" altLang="en-US" sz="2400">
+              <a:solidFill>
+                <a:schemeClr val="bg1"/>
+              </a:solidFill>
+              <a:latin typeface="微软雅黑" charset="0"/>
+              <a:ea typeface="微软雅黑" charset="0"/>
+            </a:endParaRPr>
+          </a:p>
+          <a:p>
+            <a:pPr algn="l">
+              <a:lnSpc>
+                <a:spcPct val="100000"/>
+              </a:lnSpc>
+            </a:pPr>
+            <a:r>
+              <a:rPr lang="zh-CN" altLang="en-US" sz="2400">
+                <a:solidFill>
+                  <a:schemeClr val="bg1"/>
+                </a:solidFill>
+                <a:latin typeface="微软雅黑" charset="0"/>
+                <a:ea typeface="微软雅黑" charset="0"/>
+              </a:rPr>
+              <a:t>每一次的成功都会发放</a:t>
+            </a:r>
+            <a:r>
+              <a:rPr lang="en-US" altLang="zh-CN" sz="2400">
+                <a:solidFill>
+                  <a:schemeClr val="bg1"/>
+                </a:solidFill>
+                <a:latin typeface="微软雅黑" charset="0"/>
+                <a:ea typeface="微软雅黑" charset="0"/>
+              </a:rPr>
+              <a:t>token </a:t>
+            </a:r>
+            <a:r>
+              <a:rPr lang="zh-CN" altLang="en-US" sz="2400">
+                <a:solidFill>
+                  <a:schemeClr val="bg1"/>
+                </a:solidFill>
+                <a:latin typeface="微软雅黑" charset="0"/>
+                <a:ea typeface="微软雅黑" charset="0"/>
+              </a:rPr>
+              <a:t>以及</a:t>
+            </a:r>
+            <a:r>
+              <a:rPr lang="en-US" altLang="zh-CN" sz="2400">
+                <a:solidFill>
+                  <a:schemeClr val="bg1"/>
+                </a:solidFill>
+                <a:latin typeface="微软雅黑" charset="0"/>
+                <a:ea typeface="微软雅黑" charset="0"/>
+              </a:rPr>
+              <a:t>nft</a:t>
+            </a:r>
+            <a:r>
+              <a:rPr lang="zh-CN" altLang="en-US" sz="2400">
+                <a:solidFill>
+                  <a:schemeClr val="bg1"/>
+                </a:solidFill>
+                <a:latin typeface="微软雅黑" charset="0"/>
+                <a:ea typeface="微软雅黑" charset="0"/>
+              </a:rPr>
+              <a:t>碎片给予</a:t>
+            </a:r>
+            <a:r>
+              <a:rPr lang="zh-CN" altLang="en-US" sz="2400">
+                <a:solidFill>
+                  <a:schemeClr val="accent4"/>
+                </a:solidFill>
+                <a:latin typeface="微软雅黑" charset="0"/>
+                <a:ea typeface="微软雅黑" charset="0"/>
+              </a:rPr>
+              <a:t>奖励</a:t>
+            </a:r>
+            <a:endParaRPr lang="zh-CN" altLang="en-US" sz="2400">
+              <a:solidFill>
+                <a:schemeClr val="bg1"/>
+              </a:solidFill>
+              <a:latin typeface="微软雅黑" charset="0"/>
+              <a:ea typeface="微软雅黑" charset="0"/>
+            </a:endParaRPr>
+          </a:p>
+          <a:p>
+            <a:pPr algn="l">
+              <a:lnSpc>
+                <a:spcPct val="100000"/>
+              </a:lnSpc>
+            </a:pPr>
+            <a:r>
+              <a:rPr lang="zh-CN" altLang="en-US" sz="2400">
+                <a:solidFill>
+                  <a:schemeClr val="bg1"/>
+                </a:solidFill>
+                <a:latin typeface="微软雅黑" charset="0"/>
+                <a:ea typeface="微软雅黑" charset="0"/>
+              </a:rPr>
+              <a:t>如果失败，世界将</a:t>
+            </a:r>
+            <a:r>
+              <a:rPr lang="zh-CN" altLang="en-US" sz="2400">
+                <a:solidFill>
+                  <a:schemeClr val="accent1"/>
+                </a:solidFill>
+                <a:latin typeface="微软雅黑" charset="0"/>
+                <a:ea typeface="微软雅黑" charset="0"/>
+              </a:rPr>
+              <a:t>奔溃</a:t>
+            </a:r>
+            <a:r>
+              <a:rPr lang="zh-CN" altLang="en-US" sz="2400">
+                <a:solidFill>
+                  <a:schemeClr val="bg1"/>
+                </a:solidFill>
+                <a:latin typeface="微软雅黑" charset="0"/>
+                <a:ea typeface="微软雅黑" charset="0"/>
+              </a:rPr>
+              <a:t>。</a:t>
+            </a:r>
+            <a:endParaRPr lang="zh-CN" altLang="en-US" sz="2800">
+              <a:solidFill>
+                <a:schemeClr val="bg1"/>
+              </a:solidFill>
+              <a:latin typeface="微软雅黑" charset="0"/>
+              <a:ea typeface="微软雅黑" charset="0"/>
+            </a:endParaRPr>
+          </a:p>
+          <a:p>
+            <a:pPr algn="l">
+              <a:lnSpc>
+                <a:spcPct val="100000"/>
+              </a:lnSpc>
+            </a:pPr>
+            <a:endParaRPr lang="zh-CN" altLang="en-US" sz="2800">
+              <a:solidFill>
+                <a:schemeClr val="bg1"/>
+              </a:solidFill>
+              <a:latin typeface="微软雅黑" charset="0"/>
+              <a:ea typeface="微软雅黑" charset="0"/>
+            </a:endParaRPr>
+          </a:p>
+          <a:p>
+            <a:pPr algn="l">
+              <a:lnSpc>
+                <a:spcPct val="100000"/>
+              </a:lnSpc>
+            </a:pPr>
             <a:r>
               <a:rPr lang="zh-CN" altLang="en-US" sz="2800">
                 <a:solidFill>
@@ -4190,7 +4712,17 @@
                 <a:latin typeface="微软雅黑" charset="0"/>
                 <a:ea typeface="微软雅黑" charset="0"/>
               </a:rPr>
-              <a:t>光与暗的斗争，只有每个人都贡献光力量世界才得以维续</a:t>
+              <a:t>故事的设计会经历三个阶段：</a:t>
+            </a:r>
+            <a:r>
+              <a:rPr lang="zh-CN" altLang="en-US" sz="2800">
+                <a:solidFill>
+                  <a:srgbClr val="FFFF00"/>
+                </a:solidFill>
+                <a:latin typeface="微软雅黑" charset="0"/>
+                <a:ea typeface="微软雅黑" charset="0"/>
+              </a:rPr>
+              <a:t>起源，裂变，平衡</a:t>
             </a:r>
             <a:endParaRPr lang="zh-CN" altLang="en-US" sz="2800">
               <a:solidFill>
@@ -4201,6 +4733,11 @@
             </a:endParaRPr>
           </a:p>
           <a:p>
+            <a:pPr algn="l">
+              <a:lnSpc>
+                <a:spcPct val="100000"/>
+              </a:lnSpc>
+            </a:pPr>
             <a:r>
               <a:rPr lang="zh-CN" altLang="en-US" sz="2800">
                 <a:solidFill>
@@ -4209,76 +4746,8 @@
                 <a:latin typeface="微软雅黑" charset="0"/>
                 <a:ea typeface="微软雅黑" charset="0"/>
               </a:rPr>
-              <a:t>每一次的成功都会产生</a:t>
-            </a:r>
-            <a:r>
-              <a:rPr lang="en-US" altLang="zh-CN" sz="2800">
-                <a:solidFill>
-                  <a:schemeClr val="bg1"/>
-                </a:solidFill>
-                <a:latin typeface="微软雅黑" charset="0"/>
-                <a:ea typeface="微软雅黑" charset="0"/>
-              </a:rPr>
-              <a:t>token </a:t>
-            </a:r>
-            <a:r>
-              <a:rPr lang="zh-CN" altLang="en-US" sz="2800">
-                <a:solidFill>
-                  <a:schemeClr val="bg1"/>
-                </a:solidFill>
-                <a:latin typeface="微软雅黑" charset="0"/>
-                <a:ea typeface="微软雅黑" charset="0"/>
-              </a:rPr>
-              <a:t>以及金木水火土的</a:t>
-            </a:r>
-            <a:r>
-              <a:rPr lang="en-US" altLang="zh-CN" sz="2800">
-                <a:solidFill>
-                  <a:schemeClr val="bg1"/>
-                </a:solidFill>
-                <a:latin typeface="微软雅黑" charset="0"/>
-                <a:ea typeface="微软雅黑" charset="0"/>
-              </a:rPr>
-              <a:t>nft</a:t>
-            </a:r>
-            <a:r>
-              <a:rPr lang="zh-CN" altLang="en-US" sz="2800">
-                <a:solidFill>
-                  <a:schemeClr val="bg1"/>
-                </a:solidFill>
-                <a:latin typeface="微软雅黑" charset="0"/>
-                <a:ea typeface="微软雅黑" charset="0"/>
-              </a:rPr>
-              <a:t>碎片，</a:t>
-            </a:r>
-            <a:endParaRPr lang="zh-CN" altLang="en-US" sz="2800">
-              <a:solidFill>
-                <a:schemeClr val="bg1"/>
-              </a:solidFill>
-              <a:latin typeface="微软雅黑" charset="0"/>
-              <a:ea typeface="微软雅黑" charset="0"/>
-            </a:endParaRPr>
-          </a:p>
-          <a:p>
-            <a:r>
-              <a:rPr lang="zh-CN" altLang="en-US" sz="2800">
-                <a:solidFill>
-                  <a:schemeClr val="bg1"/>
-                </a:solidFill>
-                <a:latin typeface="微软雅黑" charset="0"/>
-                <a:ea typeface="微软雅黑" charset="0"/>
-              </a:rPr>
-              <a:t>着光暗金木水火土构成了后期构建真个世界的最小单元</a:t>
-            </a:r>
-            <a:endParaRPr lang="zh-CN" altLang="en-US" sz="2800">
-              <a:solidFill>
-                <a:schemeClr val="bg1"/>
-              </a:solidFill>
-              <a:latin typeface="微软雅黑" charset="0"/>
-              <a:ea typeface="微软雅黑" charset="0"/>
-            </a:endParaRPr>
-          </a:p>
-          <a:p>
+              <a:t>（本次的开发内容为起源的一小小小小段）</a:t>
+            </a:r>
             <a:endParaRPr lang="zh-CN" altLang="en-US" sz="2800">
               <a:solidFill>
                 <a:schemeClr val="bg1"/>
@@ -4323,7 +4792,7 @@
         </p:nvSpPr>
         <p:spPr>
           <a:xfrm>
-            <a:off x="706755" y="640080"/>
+            <a:off x="706755" y="655955"/>
             <a:ext cx="1097280" cy="645160"/>
           </a:xfrm>
           <a:prstGeom prst="rect">
@@ -4344,7 +4813,7 @@
                 <a:latin typeface="微软雅黑" charset="0"/>
                 <a:ea typeface="微软雅黑" charset="0"/>
               </a:rPr>
-              <a:t>裂变</a:t>
+              <a:t>起源</a:t>
             </a:r>
             <a:endParaRPr lang="zh-CN" altLang="en-US" sz="3600">
               <a:solidFill>
@@ -4365,7 +4834,7 @@
         <p:spPr>
           <a:xfrm>
             <a:off x="706755" y="1593215"/>
-            <a:ext cx="10850880" cy="3107690"/>
+            <a:ext cx="9428480" cy="2676525"/>
           </a:xfrm>
           <a:prstGeom prst="rect">
             <a:avLst/>
@@ -4385,7 +4854,26 @@
                 <a:latin typeface="微软雅黑" charset="0"/>
                 <a:ea typeface="微软雅黑" charset="0"/>
               </a:rPr>
-              <a:t>基于稳定状态，</a:t>
+              <a:t>光与暗的斗争，只有每个人都贡献光力量世界才得以维续</a:t>
+            </a:r>
+            <a:endParaRPr lang="zh-CN" altLang="en-US" sz="2800">
+              <a:solidFill>
+                <a:schemeClr val="bg1"/>
+              </a:solidFill>
+              <a:latin typeface="微软雅黑" charset="0"/>
+              <a:ea typeface="微软雅黑" charset="0"/>
+            </a:endParaRPr>
+          </a:p>
+          <a:p>
+            <a:r>
+              <a:rPr lang="zh-CN" altLang="en-US" sz="2800">
+                <a:solidFill>
+                  <a:schemeClr val="bg1"/>
+                </a:solidFill>
+                <a:latin typeface="微软雅黑" charset="0"/>
+                <a:ea typeface="微软雅黑" charset="0"/>
+              </a:rPr>
+              <a:t>每一次的成功都会产生</a:t>
             </a:r>
             <a:r>
               <a:rPr lang="en-US" altLang="zh-CN" sz="2800">
@@ -4395,6 +4883,26 @@
                 <a:latin typeface="微软雅黑" charset="0"/>
                 <a:ea typeface="微软雅黑" charset="0"/>
               </a:rPr>
+              <a:t>token </a:t>
+            </a:r>
+            <a:r>
+              <a:rPr lang="zh-CN" altLang="en-US" sz="2800">
+                <a:solidFill>
+                  <a:schemeClr val="bg1"/>
+                </a:solidFill>
+                <a:latin typeface="微软雅黑" charset="0"/>
+                <a:ea typeface="微软雅黑" charset="0"/>
+              </a:rPr>
+              <a:t>以及金木水火土的</a:t>
+            </a:r>
+            <a:r>
+              <a:rPr lang="en-US" altLang="zh-CN" sz="2800">
+                <a:solidFill>
+                  <a:schemeClr val="bg1"/>
+                </a:solidFill>
+                <a:latin typeface="微软雅黑" charset="0"/>
+                <a:ea typeface="微软雅黑" charset="0"/>
+              </a:rPr>
               <a:t>nft</a:t>
             </a:r>
             <a:r>
@@ -4405,7 +4913,7 @@
                 <a:latin typeface="微软雅黑" charset="0"/>
                 <a:ea typeface="微软雅黑" charset="0"/>
               </a:rPr>
-              <a:t>道具的组件，有了很容易度过暗时间来临的方式</a:t>
+              <a:t>碎片，</a:t>
             </a:r>
             <a:endParaRPr lang="zh-CN" altLang="en-US" sz="2800">
               <a:solidFill>
@@ -4424,7 +4932,7 @@
                 <a:latin typeface="微软雅黑" charset="0"/>
                 <a:ea typeface="微软雅黑" charset="0"/>
               </a:rPr>
-              <a:t>（比如支招</a:t>
+              <a:t>这</a:t>
             </a:r>
             <a:r>
               <a:rPr lang="en-US" altLang="zh-CN" sz="2800">
@@ -4434,7 +4942,7 @@
                 <a:latin typeface="微软雅黑" charset="0"/>
                 <a:ea typeface="微软雅黑" charset="0"/>
               </a:rPr>
-              <a:t>nft</a:t>
+              <a:t>&lt;</a:t>
             </a:r>
             <a:r>
               <a:rPr lang="zh-CN" altLang="en-US" sz="2800">
@@ -4444,7 +4952,37 @@
                 <a:latin typeface="微软雅黑" charset="0"/>
                 <a:ea typeface="微软雅黑" charset="0"/>
               </a:rPr>
-              <a:t>道具，聚光塔什么的）</a:t>
+              <a:t>光暗金木水火土</a:t>
+            </a:r>
+            <a:r>
+              <a:rPr lang="en-US" altLang="zh-CN" sz="2800">
+                <a:solidFill>
+                  <a:schemeClr val="bg1"/>
+                </a:solidFill>
+                <a:latin typeface="微软雅黑" charset="0"/>
+                <a:ea typeface="微软雅黑" charset="0"/>
+              </a:rPr>
+              <a:t>&gt;</a:t>
+            </a:r>
+            <a:r>
+              <a:rPr lang="zh-CN" altLang="en-US" sz="2800">
+                <a:solidFill>
+                  <a:schemeClr val="bg1"/>
+                </a:solidFill>
+                <a:latin typeface="微软雅黑" charset="0"/>
+                <a:ea typeface="微软雅黑" charset="0"/>
+              </a:rPr>
+              <a:t>构成了后期构建真个</a:t>
+            </a:r>
+            <a:r>
+              <a:rPr lang="zh-CN" altLang="en-US" sz="2800">
+                <a:solidFill>
+                  <a:srgbClr val="FFFF00"/>
+                </a:solidFill>
+                <a:latin typeface="微软雅黑" charset="0"/>
+                <a:ea typeface="微软雅黑" charset="0"/>
+              </a:rPr>
+              <a:t>世界的最小单元</a:t>
             </a:r>
             <a:endParaRPr lang="zh-CN" altLang="en-US" sz="2800">
               <a:solidFill>
@@ -4455,6 +4993,15 @@
             </a:endParaRPr>
           </a:p>
           <a:p>
+            <a:endParaRPr lang="zh-CN" altLang="en-US" sz="2800">
+              <a:solidFill>
+                <a:schemeClr val="bg1"/>
+              </a:solidFill>
+              <a:latin typeface="微软雅黑" charset="0"/>
+              <a:ea typeface="微软雅黑" charset="0"/>
+            </a:endParaRPr>
+          </a:p>
+          <a:p>
             <a:r>
               <a:rPr lang="zh-CN" altLang="en-US" sz="2800">
                 <a:solidFill>
@@ -4463,77 +5010,30 @@
                 <a:latin typeface="微软雅黑" charset="0"/>
                 <a:ea typeface="微软雅黑" charset="0"/>
               </a:rPr>
-              <a:t>进一步加快世界的形成，交易的形成，这个时候不仅仅只是为了抵抗</a:t>
+              <a:t>输送能量（每天打卡）形成了维持这个</a:t>
+            </a:r>
+            <a:r>
+              <a:rPr lang="zh-CN" altLang="en-US" sz="2800">
+                <a:solidFill>
+                  <a:srgbClr val="FFFF00"/>
+                </a:solidFill>
+                <a:latin typeface="微软雅黑" charset="0"/>
+                <a:ea typeface="微软雅黑" charset="0"/>
+              </a:rPr>
+              <a:t>世界持续的最小动力</a:t>
             </a:r>
             <a:endParaRPr lang="zh-CN" altLang="en-US" sz="2800">
               <a:solidFill>
-                <a:schemeClr val="bg1"/>
-              </a:solidFill>
-              <a:latin typeface="微软雅黑" charset="0"/>
-              <a:ea typeface="微软雅黑" charset="0"/>
-            </a:endParaRPr>
-          </a:p>
-          <a:p>
-            <a:r>
-              <a:rPr lang="zh-CN" altLang="en-US" sz="2800">
-                <a:solidFill>
-                  <a:schemeClr val="bg1"/>
-                </a:solidFill>
-                <a:latin typeface="微软雅黑" charset="0"/>
-                <a:ea typeface="微软雅黑" charset="0"/>
-              </a:rPr>
-              <a:t>暗物质侵袭，同时还好保证系统内的金木水火土属性的平衡，每一个</a:t>
-            </a:r>
+                <a:srgbClr val="FFFF00"/>
+              </a:solidFill>
+              <a:latin typeface="微软雅黑" charset="0"/>
+              <a:ea typeface="微软雅黑" charset="0"/>
+            </a:endParaRPr>
+          </a:p>
+          <a:p>
             <a:endParaRPr lang="zh-CN" altLang="en-US" sz="2800">
               <a:solidFill>
-                <a:schemeClr val="bg1"/>
-              </a:solidFill>
-              <a:latin typeface="微软雅黑" charset="0"/>
-              <a:ea typeface="微软雅黑" charset="0"/>
-            </a:endParaRPr>
-          </a:p>
-          <a:p>
-            <a:r>
-              <a:rPr lang="zh-CN" altLang="en-US" sz="2800">
-                <a:solidFill>
-                  <a:schemeClr val="bg1"/>
-                </a:solidFill>
-                <a:latin typeface="微软雅黑" charset="0"/>
-                <a:ea typeface="微软雅黑" charset="0"/>
-              </a:rPr>
-              <a:t>家族的势力的扩大也可能导致失衡走向自毁</a:t>
-            </a:r>
-            <a:endParaRPr lang="zh-CN" altLang="en-US" sz="2800">
-              <a:solidFill>
-                <a:schemeClr val="bg1"/>
-              </a:solidFill>
-              <a:latin typeface="微软雅黑" charset="0"/>
-              <a:ea typeface="微软雅黑" charset="0"/>
-            </a:endParaRPr>
-          </a:p>
-          <a:p>
-            <a:endParaRPr lang="zh-CN" altLang="en-US" sz="2800">
-              <a:solidFill>
-                <a:schemeClr val="bg1"/>
-              </a:solidFill>
-              <a:latin typeface="微软雅黑" charset="0"/>
-              <a:ea typeface="微软雅黑" charset="0"/>
-            </a:endParaRPr>
-          </a:p>
-          <a:p>
-            <a:r>
-              <a:rPr lang="zh-CN" altLang="en-US" sz="2800">
-                <a:solidFill>
-                  <a:schemeClr val="bg1"/>
-                </a:solidFill>
-                <a:latin typeface="微软雅黑" charset="0"/>
-                <a:ea typeface="微软雅黑" charset="0"/>
-              </a:rPr>
-              <a:t>同时没过一段时间就会有打的暗物质侵袭，需要协同一起解决</a:t>
-            </a:r>
-            <a:endParaRPr lang="zh-CN" altLang="en-US" sz="2800">
-              <a:solidFill>
-                <a:schemeClr val="bg1"/>
+                <a:srgbClr val="FFFF00"/>
               </a:solidFill>
               <a:latin typeface="微软雅黑" charset="0"/>
               <a:ea typeface="微软雅黑" charset="0"/>
@@ -4596,6 +5096,308 @@
                 <a:latin typeface="微软雅黑" charset="0"/>
                 <a:ea typeface="微软雅黑" charset="0"/>
               </a:rPr>
+              <a:t>裂变</a:t>
+            </a:r>
+            <a:endParaRPr lang="zh-CN" altLang="en-US" sz="3600">
+              <a:solidFill>
+                <a:schemeClr val="bg1"/>
+              </a:solidFill>
+              <a:latin typeface="微软雅黑" charset="0"/>
+              <a:ea typeface="微软雅黑" charset="0"/>
+            </a:endParaRPr>
+          </a:p>
+        </p:txBody>
+      </p:sp>
+      <p:sp>
+        <p:nvSpPr>
+          <p:cNvPr id="6" name="文本框 5"/>
+          <p:cNvSpPr txBox="1"/>
+          <p:nvPr/>
+        </p:nvSpPr>
+        <p:spPr>
+          <a:xfrm>
+            <a:off x="706755" y="1604645"/>
+            <a:ext cx="10850880" cy="3107690"/>
+          </a:xfrm>
+          <a:prstGeom prst="rect">
+            <a:avLst/>
+          </a:prstGeom>
+          <a:noFill/>
+        </p:spPr>
+        <p:txBody>
+          <a:bodyPr wrap="none" rtlCol="0">
+            <a:spAutoFit/>
+          </a:bodyPr>
+          <a:p>
+            <a:r>
+              <a:rPr lang="zh-CN" altLang="en-US" sz="2800">
+                <a:solidFill>
+                  <a:schemeClr val="bg1"/>
+                </a:solidFill>
+                <a:latin typeface="微软雅黑" charset="0"/>
+                <a:ea typeface="微软雅黑" charset="0"/>
+              </a:rPr>
+              <a:t>基于稳定状态，</a:t>
+            </a:r>
+            <a:r>
+              <a:rPr lang="en-US" altLang="zh-CN" sz="2800">
+                <a:solidFill>
+                  <a:schemeClr val="bg1"/>
+                </a:solidFill>
+                <a:latin typeface="微软雅黑" charset="0"/>
+                <a:ea typeface="微软雅黑" charset="0"/>
+              </a:rPr>
+              <a:t>nft</a:t>
+            </a:r>
+            <a:r>
+              <a:rPr lang="zh-CN" altLang="en-US" sz="2800">
+                <a:solidFill>
+                  <a:schemeClr val="bg1"/>
+                </a:solidFill>
+                <a:latin typeface="微软雅黑" charset="0"/>
+                <a:ea typeface="微软雅黑" charset="0"/>
+              </a:rPr>
+              <a:t>道具的组件，有了很容易度过暗时间来临的方式</a:t>
+            </a:r>
+            <a:endParaRPr lang="zh-CN" altLang="en-US" sz="2800">
+              <a:solidFill>
+                <a:schemeClr val="bg1"/>
+              </a:solidFill>
+              <a:latin typeface="微软雅黑" charset="0"/>
+              <a:ea typeface="微软雅黑" charset="0"/>
+            </a:endParaRPr>
+          </a:p>
+          <a:p>
+            <a:r>
+              <a:rPr lang="zh-CN" altLang="en-US" sz="2800">
+                <a:solidFill>
+                  <a:schemeClr val="bg1"/>
+                </a:solidFill>
+                <a:latin typeface="微软雅黑" charset="0"/>
+                <a:ea typeface="微软雅黑" charset="0"/>
+              </a:rPr>
+              <a:t>（比如支招</a:t>
+            </a:r>
+            <a:r>
+              <a:rPr lang="en-US" altLang="zh-CN" sz="2800">
+                <a:solidFill>
+                  <a:schemeClr val="bg1"/>
+                </a:solidFill>
+                <a:latin typeface="微软雅黑" charset="0"/>
+                <a:ea typeface="微软雅黑" charset="0"/>
+              </a:rPr>
+              <a:t>nft</a:t>
+            </a:r>
+            <a:r>
+              <a:rPr lang="zh-CN" altLang="en-US" sz="2800">
+                <a:solidFill>
+                  <a:schemeClr val="bg1"/>
+                </a:solidFill>
+                <a:latin typeface="微软雅黑" charset="0"/>
+                <a:ea typeface="微软雅黑" charset="0"/>
+              </a:rPr>
+              <a:t>道具，聚光塔什么的）</a:t>
+            </a:r>
+            <a:endParaRPr lang="zh-CN" altLang="en-US" sz="2800">
+              <a:solidFill>
+                <a:schemeClr val="bg1"/>
+              </a:solidFill>
+              <a:latin typeface="微软雅黑" charset="0"/>
+              <a:ea typeface="微软雅黑" charset="0"/>
+            </a:endParaRPr>
+          </a:p>
+          <a:p>
+            <a:r>
+              <a:rPr lang="zh-CN" altLang="en-US" sz="2800">
+                <a:solidFill>
+                  <a:schemeClr val="bg1"/>
+                </a:solidFill>
+                <a:latin typeface="微软雅黑" charset="0"/>
+                <a:ea typeface="微软雅黑" charset="0"/>
+              </a:rPr>
+              <a:t>进一步加快世界的形成，交易的形成，这个时候不仅仅只是为了抵抗</a:t>
+            </a:r>
+            <a:endParaRPr lang="zh-CN" altLang="en-US" sz="2800">
+              <a:solidFill>
+                <a:schemeClr val="bg1"/>
+              </a:solidFill>
+              <a:latin typeface="微软雅黑" charset="0"/>
+              <a:ea typeface="微软雅黑" charset="0"/>
+            </a:endParaRPr>
+          </a:p>
+          <a:p>
+            <a:r>
+              <a:rPr lang="zh-CN" altLang="en-US" sz="2800">
+                <a:solidFill>
+                  <a:schemeClr val="bg1"/>
+                </a:solidFill>
+                <a:latin typeface="微软雅黑" charset="0"/>
+                <a:ea typeface="微软雅黑" charset="0"/>
+              </a:rPr>
+              <a:t>暗物质侵袭，同时还要保证系统内的金木水火土属性的</a:t>
+            </a:r>
+            <a:r>
+              <a:rPr lang="zh-CN" altLang="en-US" sz="2800">
+                <a:solidFill>
+                  <a:schemeClr val="accent1"/>
+                </a:solidFill>
+                <a:latin typeface="微软雅黑" charset="0"/>
+                <a:ea typeface="微软雅黑" charset="0"/>
+              </a:rPr>
+              <a:t>平衡</a:t>
+            </a:r>
+            <a:r>
+              <a:rPr lang="zh-CN" altLang="en-US" sz="2800">
+                <a:solidFill>
+                  <a:schemeClr val="bg1"/>
+                </a:solidFill>
+                <a:latin typeface="微软雅黑" charset="0"/>
+                <a:ea typeface="微软雅黑" charset="0"/>
+              </a:rPr>
+              <a:t>，每一个</a:t>
+            </a:r>
+            <a:endParaRPr lang="zh-CN" altLang="en-US" sz="2800">
+              <a:solidFill>
+                <a:schemeClr val="bg1"/>
+              </a:solidFill>
+              <a:latin typeface="微软雅黑" charset="0"/>
+              <a:ea typeface="微软雅黑" charset="0"/>
+            </a:endParaRPr>
+          </a:p>
+          <a:p>
+            <a:r>
+              <a:rPr lang="zh-CN" altLang="en-US" sz="2800">
+                <a:solidFill>
+                  <a:schemeClr val="bg1"/>
+                </a:solidFill>
+                <a:latin typeface="微软雅黑" charset="0"/>
+                <a:ea typeface="微软雅黑" charset="0"/>
+              </a:rPr>
+              <a:t>家族的势力的扩大也可能</a:t>
+            </a:r>
+            <a:r>
+              <a:rPr lang="zh-CN" altLang="en-US" sz="2800">
+                <a:solidFill>
+                  <a:schemeClr val="accent1"/>
+                </a:solidFill>
+                <a:latin typeface="微软雅黑" charset="0"/>
+                <a:ea typeface="微软雅黑" charset="0"/>
+              </a:rPr>
+              <a:t>导致失衡走向自毁</a:t>
+            </a:r>
+            <a:endParaRPr lang="zh-CN" altLang="en-US" sz="2800">
+              <a:solidFill>
+                <a:schemeClr val="accent1"/>
+              </a:solidFill>
+              <a:latin typeface="微软雅黑" charset="0"/>
+              <a:ea typeface="微软雅黑" charset="0"/>
+            </a:endParaRPr>
+          </a:p>
+          <a:p>
+            <a:endParaRPr lang="zh-CN" altLang="en-US" sz="2800">
+              <a:solidFill>
+                <a:schemeClr val="bg1"/>
+              </a:solidFill>
+              <a:latin typeface="微软雅黑" charset="0"/>
+              <a:ea typeface="微软雅黑" charset="0"/>
+            </a:endParaRPr>
+          </a:p>
+          <a:p>
+            <a:r>
+              <a:rPr lang="zh-CN" altLang="en-US" sz="2800">
+                <a:solidFill>
+                  <a:schemeClr val="bg1"/>
+                </a:solidFill>
+                <a:latin typeface="微软雅黑" charset="0"/>
+                <a:ea typeface="微软雅黑" charset="0"/>
+              </a:rPr>
+              <a:t>同时没过一段时间就会有</a:t>
+            </a:r>
+            <a:r>
+              <a:rPr lang="zh-CN" altLang="en-US" sz="2800">
+                <a:solidFill>
+                  <a:srgbClr val="FF0000"/>
+                </a:solidFill>
+                <a:latin typeface="微软雅黑" charset="0"/>
+                <a:ea typeface="微软雅黑" charset="0"/>
+              </a:rPr>
+              <a:t>大型</a:t>
+            </a:r>
+            <a:r>
+              <a:rPr lang="zh-CN" altLang="en-US" sz="2800">
+                <a:solidFill>
+                  <a:schemeClr val="bg1"/>
+                </a:solidFill>
+                <a:latin typeface="微软雅黑" charset="0"/>
+                <a:ea typeface="微软雅黑" charset="0"/>
+              </a:rPr>
+              <a:t>的暗物质侵袭，需要协同一起解决</a:t>
+            </a:r>
+            <a:endParaRPr lang="zh-CN" altLang="en-US" sz="2800">
+              <a:solidFill>
+                <a:schemeClr val="bg1"/>
+              </a:solidFill>
+              <a:latin typeface="微软雅黑" charset="0"/>
+              <a:ea typeface="微软雅黑" charset="0"/>
+            </a:endParaRPr>
+          </a:p>
+        </p:txBody>
+      </p:sp>
+    </p:spTree>
+  </p:cSld>
+  <p:clrMapOvr>
+    <a:masterClrMapping/>
+  </p:clrMapOvr>
+</p:sld>
+</file>
+
+<file path=ppt/slides/slide5.xml><?xml version="1.0" encoding="utf-8"?>
+<p:sld xmlns:a="http://schemas.openxmlformats.org/drawingml/2006/main" xmlns:r="http://schemas.openxmlformats.org/officeDocument/2006/relationships" xmlns:p="http://schemas.openxmlformats.org/presentationml/2006/main">
+  <p:cSld>
+    <p:bg>
+      <p:bgPr>
+        <a:solidFill>
+          <a:schemeClr val="tx1"/>
+        </a:solidFill>
+        <a:effectLst/>
+      </p:bgPr>
+    </p:bg>
+    <p:spTree>
+      <p:nvGrpSpPr>
+        <p:cNvPr id="1" name=""/>
+        <p:cNvGrpSpPr/>
+        <p:nvPr/>
+      </p:nvGrpSpPr>
+      <p:grpSpPr/>
+      <p:sp>
+        <p:nvSpPr>
+          <p:cNvPr id="4" name="文本框 3"/>
+          <p:cNvSpPr txBox="1"/>
+          <p:nvPr/>
+        </p:nvSpPr>
+        <p:spPr>
+          <a:xfrm>
+            <a:off x="706755" y="640080"/>
+            <a:ext cx="1097280" cy="645160"/>
+          </a:xfrm>
+          <a:prstGeom prst="rect">
+            <a:avLst/>
+          </a:prstGeom>
+          <a:noFill/>
+        </p:spPr>
+        <p:txBody>
+          <a:bodyPr wrap="none" rtlCol="0">
+            <a:spAutoFit/>
+          </a:bodyPr>
+          <a:p>
+            <a:r>
+              <a:rPr lang="zh-CN" altLang="en-US" sz="3600">
+                <a:solidFill>
+                  <a:schemeClr val="bg1"/>
+                </a:solidFill>
+                <a:latin typeface="微软雅黑" charset="0"/>
+                <a:ea typeface="微软雅黑" charset="0"/>
+              </a:rPr>
               <a:t>平衡</a:t>
             </a:r>
             <a:endParaRPr lang="zh-CN" altLang="en-US" sz="3600">
@@ -4637,7 +5439,47 @@
                 <a:latin typeface="微软雅黑" charset="0"/>
                 <a:ea typeface="微软雅黑" charset="0"/>
               </a:rPr>
-              <a:t>健康的世界处于一种外平衡，和内平衡的状态。</a:t>
+              <a:t>健康的世界处于一种</a:t>
+            </a:r>
+            <a:r>
+              <a:rPr lang="zh-CN" altLang="en-US" sz="2800">
+                <a:solidFill>
+                  <a:srgbClr val="FFC000"/>
+                </a:solidFill>
+                <a:latin typeface="微软雅黑" charset="0"/>
+                <a:ea typeface="微软雅黑" charset="0"/>
+              </a:rPr>
+              <a:t>外平衡</a:t>
+            </a:r>
+            <a:r>
+              <a:rPr lang="zh-CN" altLang="en-US" sz="2800">
+                <a:solidFill>
+                  <a:schemeClr val="bg1"/>
+                </a:solidFill>
+                <a:latin typeface="微软雅黑" charset="0"/>
+                <a:ea typeface="微软雅黑" charset="0"/>
+              </a:rPr>
+              <a:t>，和</a:t>
+            </a:r>
+            <a:r>
+              <a:rPr lang="zh-CN" altLang="en-US" sz="2800">
+                <a:solidFill>
+                  <a:srgbClr val="FFC000"/>
+                </a:solidFill>
+                <a:latin typeface="微软雅黑" charset="0"/>
+                <a:ea typeface="微软雅黑" charset="0"/>
+              </a:rPr>
+              <a:t>内平衡</a:t>
+            </a:r>
+            <a:r>
+              <a:rPr lang="zh-CN" altLang="en-US" sz="2800">
+                <a:solidFill>
+                  <a:schemeClr val="bg1"/>
+                </a:solidFill>
+                <a:latin typeface="微软雅黑" charset="0"/>
+                <a:ea typeface="微软雅黑" charset="0"/>
+              </a:rPr>
+              <a:t>的状态。</a:t>
             </a:r>
             <a:endParaRPr lang="zh-CN" altLang="en-US" sz="2800">
               <a:solidFill>
@@ -4732,7 +5574,74 @@
 </p:sld>
 </file>
 
-<file path=ppt/slides/slide5.xml><?xml version="1.0" encoding="utf-8"?>
+<file path=ppt/slides/slide6.xml><?xml version="1.0" encoding="utf-8"?>
+<p:sld xmlns:a="http://schemas.openxmlformats.org/drawingml/2006/main" xmlns:r="http://schemas.openxmlformats.org/officeDocument/2006/relationships" xmlns:p="http://schemas.openxmlformats.org/presentationml/2006/main">
+  <p:cSld>
+    <p:bg>
+      <p:bgPr>
+        <a:solidFill>
+          <a:schemeClr val="tx1"/>
+        </a:solidFill>
+        <a:effectLst/>
+      </p:bgPr>
+    </p:bg>
+    <p:spTree>
+      <p:nvGrpSpPr>
+        <p:cNvPr id="1" name=""/>
+        <p:cNvGrpSpPr/>
+        <p:nvPr/>
+      </p:nvGrpSpPr>
+      <p:grpSpPr/>
+      <p:sp>
+        <p:nvSpPr>
+          <p:cNvPr id="9" name="文本框 8"/>
+          <p:cNvSpPr txBox="1"/>
+          <p:nvPr/>
+        </p:nvSpPr>
+        <p:spPr>
+          <a:xfrm>
+            <a:off x="5090160" y="2609215"/>
+            <a:ext cx="2011680" cy="645160"/>
+          </a:xfrm>
+          <a:prstGeom prst="rect">
+            <a:avLst/>
+          </a:prstGeom>
+          <a:noFill/>
+        </p:spPr>
+        <p:txBody>
+          <a:bodyPr wrap="none" rtlCol="0">
+            <a:spAutoFit/>
+          </a:bodyPr>
+          <a:p>
+            <a:r>
+              <a:rPr lang="zh-CN" altLang="en-US" sz="3600">
+                <a:solidFill>
+                  <a:schemeClr val="bg1"/>
+                </a:solidFill>
+                <a:latin typeface="微软雅黑" charset="0"/>
+                <a:ea typeface="微软雅黑" charset="0"/>
+              </a:rPr>
+              <a:t>页面介绍</a:t>
+            </a:r>
+            <a:endParaRPr lang="zh-CN" altLang="en-US" sz="3600">
+              <a:solidFill>
+                <a:schemeClr val="bg1"/>
+              </a:solidFill>
+              <a:latin typeface="微软雅黑" charset="0"/>
+              <a:ea typeface="微软雅黑" charset="0"/>
+            </a:endParaRPr>
+          </a:p>
+        </p:txBody>
+      </p:sp>
+    </p:spTree>
+  </p:cSld>
+  <p:clrMapOvr>
+    <a:masterClrMapping/>
+  </p:clrMapOvr>
+</p:sld>
+</file>
+
+<file path=ppt/slides/slide7.xml><?xml version="1.0" encoding="utf-8"?>
 <p:sld xmlns:a="http://schemas.openxmlformats.org/drawingml/2006/main" xmlns:r="http://schemas.openxmlformats.org/officeDocument/2006/relationships" xmlns:p="http://schemas.openxmlformats.org/presentationml/2006/main">
   <p:cSld>
     <p:bg>
@@ -5171,7 +6080,7 @@
 </p:sld>
 </file>
 
-<file path=ppt/slides/slide6.xml><?xml version="1.0" encoding="utf-8"?>
+<file path=ppt/slides/slide8.xml><?xml version="1.0" encoding="utf-8"?>
 <p:sld xmlns:a="http://schemas.openxmlformats.org/drawingml/2006/main" xmlns:r="http://schemas.openxmlformats.org/officeDocument/2006/relationships" xmlns:p="http://schemas.openxmlformats.org/presentationml/2006/main">
   <p:cSld>
     <p:bg>
@@ -5458,7 +6367,7 @@
 </p:sld>
 </file>
 
-<file path=ppt/slides/slide7.xml><?xml version="1.0" encoding="utf-8"?>
+<file path=ppt/slides/slide9.xml><?xml version="1.0" encoding="utf-8"?>
 <p:sld xmlns:a="http://schemas.openxmlformats.org/drawingml/2006/main" xmlns:r="http://schemas.openxmlformats.org/officeDocument/2006/relationships" xmlns:p="http://schemas.openxmlformats.org/presentationml/2006/main">
   <p:cSld>
     <p:bg>
@@ -5811,255 +6720,6 @@
           </a:p>
           <a:p>
             <a:endParaRPr lang="zh-CN" altLang="en-US" sz="1600">
-              <a:solidFill>
-                <a:schemeClr val="bg1"/>
-              </a:solidFill>
-              <a:latin typeface="微软雅黑" charset="0"/>
-              <a:ea typeface="微软雅黑" charset="0"/>
-            </a:endParaRPr>
-          </a:p>
-        </p:txBody>
-      </p:sp>
-    </p:spTree>
-  </p:cSld>
-  <p:clrMapOvr>
-    <a:masterClrMapping/>
-  </p:clrMapOvr>
-</p:sld>
-</file>
-
-<file path=ppt/slides/slide8.xml><?xml version="1.0" encoding="utf-8"?>
-<p:sld xmlns:a="http://schemas.openxmlformats.org/drawingml/2006/main" xmlns:r="http://schemas.openxmlformats.org/officeDocument/2006/relationships" xmlns:p="http://schemas.openxmlformats.org/presentationml/2006/main">
-  <p:cSld>
-    <p:bg>
-      <p:bgPr>
-        <a:solidFill>
-          <a:schemeClr val="tx1"/>
-        </a:solidFill>
-        <a:effectLst/>
-      </p:bgPr>
-    </p:bg>
-    <p:spTree>
-      <p:nvGrpSpPr>
-        <p:cNvPr id="1" name=""/>
-        <p:cNvGrpSpPr/>
-        <p:nvPr/>
-      </p:nvGrpSpPr>
-      <p:grpSpPr/>
-      <p:pic>
-        <p:nvPicPr>
-          <p:cNvPr id="4" name="图片 3"/>
-          <p:cNvPicPr>
-            <a:picLocks noChangeAspect="1"/>
-          </p:cNvPicPr>
-          <p:nvPr/>
-        </p:nvPicPr>
-        <p:blipFill>
-          <a:blip r:embed="rId1"/>
-          <a:stretch>
-            <a:fillRect/>
-          </a:stretch>
-        </p:blipFill>
-        <p:spPr>
-          <a:xfrm>
-            <a:off x="1451610" y="1199515"/>
-            <a:ext cx="8992235" cy="2057400"/>
-          </a:xfrm>
-          <a:prstGeom prst="rect">
-            <a:avLst/>
-          </a:prstGeom>
-        </p:spPr>
-      </p:pic>
-      <p:sp>
-        <p:nvSpPr>
-          <p:cNvPr id="6" name="文本框 5"/>
-          <p:cNvSpPr txBox="1"/>
-          <p:nvPr/>
-        </p:nvSpPr>
-        <p:spPr>
-          <a:xfrm>
-            <a:off x="1451610" y="3748405"/>
-            <a:ext cx="5480050" cy="521970"/>
-          </a:xfrm>
-          <a:prstGeom prst="rect">
-            <a:avLst/>
-          </a:prstGeom>
-          <a:noFill/>
-        </p:spPr>
-        <p:txBody>
-          <a:bodyPr wrap="none" rtlCol="0">
-            <a:spAutoFit/>
-          </a:bodyPr>
-          <a:p>
-            <a:r>
-              <a:rPr lang="zh-CN" altLang="en-US" sz="2800">
-                <a:solidFill>
-                  <a:schemeClr val="bg1"/>
-                </a:solidFill>
-                <a:latin typeface="微软雅黑" charset="0"/>
-                <a:ea typeface="微软雅黑" charset="0"/>
-              </a:rPr>
-              <a:t>每完成一次贡献，光能量就会 </a:t>
-            </a:r>
-            <a:r>
-              <a:rPr lang="en-US" altLang="zh-CN" sz="2800">
-                <a:solidFill>
-                  <a:schemeClr val="bg1"/>
-                </a:solidFill>
-                <a:latin typeface="微软雅黑" charset="0"/>
-                <a:ea typeface="微软雅黑" charset="0"/>
-              </a:rPr>
-              <a:t>+ 1</a:t>
-            </a:r>
-            <a:endParaRPr lang="en-US" altLang="zh-CN" sz="2800">
-              <a:solidFill>
-                <a:schemeClr val="bg1"/>
-              </a:solidFill>
-              <a:latin typeface="微软雅黑" charset="0"/>
-              <a:ea typeface="微软雅黑" charset="0"/>
-            </a:endParaRPr>
-          </a:p>
-        </p:txBody>
-      </p:sp>
-    </p:spTree>
-  </p:cSld>
-  <p:clrMapOvr>
-    <a:masterClrMapping/>
-  </p:clrMapOvr>
-</p:sld>
-</file>
-
-<file path=ppt/slides/slide9.xml><?xml version="1.0" encoding="utf-8"?>
-<p:sld xmlns:a="http://schemas.openxmlformats.org/drawingml/2006/main" xmlns:r="http://schemas.openxmlformats.org/officeDocument/2006/relationships" xmlns:p="http://schemas.openxmlformats.org/presentationml/2006/main">
-  <p:cSld>
-    <p:bg>
-      <p:bgPr>
-        <a:solidFill>
-          <a:schemeClr val="tx1"/>
-        </a:solidFill>
-        <a:effectLst/>
-      </p:bgPr>
-    </p:bg>
-    <p:spTree>
-      <p:nvGrpSpPr>
-        <p:cNvPr id="1" name=""/>
-        <p:cNvGrpSpPr/>
-        <p:nvPr/>
-      </p:nvGrpSpPr>
-      <p:grpSpPr/>
-      <p:pic>
-        <p:nvPicPr>
-          <p:cNvPr id="4" name="图片 3"/>
-          <p:cNvPicPr>
-            <a:picLocks noChangeAspect="1"/>
-          </p:cNvPicPr>
-          <p:nvPr/>
-        </p:nvPicPr>
-        <p:blipFill>
-          <a:blip r:embed="rId1"/>
-          <a:stretch>
-            <a:fillRect/>
-          </a:stretch>
-        </p:blipFill>
-        <p:spPr>
-          <a:xfrm>
-            <a:off x="648335" y="495300"/>
-            <a:ext cx="7734935" cy="5867400"/>
-          </a:xfrm>
-          <a:prstGeom prst="rect">
-            <a:avLst/>
-          </a:prstGeom>
-        </p:spPr>
-      </p:pic>
-      <p:sp>
-        <p:nvSpPr>
-          <p:cNvPr id="6" name="文本框 5"/>
-          <p:cNvSpPr txBox="1"/>
-          <p:nvPr/>
-        </p:nvSpPr>
-        <p:spPr>
-          <a:xfrm>
-            <a:off x="8674735" y="754380"/>
-            <a:ext cx="3027680" cy="1814830"/>
-          </a:xfrm>
-          <a:prstGeom prst="rect">
-            <a:avLst/>
-          </a:prstGeom>
-          <a:noFill/>
-        </p:spPr>
-        <p:txBody>
-          <a:bodyPr wrap="none" rtlCol="0">
-            <a:spAutoFit/>
-          </a:bodyPr>
-          <a:p>
-            <a:r>
-              <a:rPr lang="zh-CN" altLang="en-US" sz="2800">
-                <a:solidFill>
-                  <a:schemeClr val="bg1"/>
-                </a:solidFill>
-                <a:latin typeface="微软雅黑" charset="0"/>
-                <a:ea typeface="微软雅黑" charset="0"/>
-              </a:rPr>
-              <a:t>每天会进行同步</a:t>
-            </a:r>
-            <a:endParaRPr lang="zh-CN" altLang="en-US" sz="2800">
-              <a:solidFill>
-                <a:schemeClr val="bg1"/>
-              </a:solidFill>
-              <a:latin typeface="微软雅黑" charset="0"/>
-              <a:ea typeface="微软雅黑" charset="0"/>
-            </a:endParaRPr>
-          </a:p>
-          <a:p>
-            <a:r>
-              <a:rPr lang="zh-CN" altLang="en-US" sz="2800">
-                <a:solidFill>
-                  <a:schemeClr val="bg1"/>
-                </a:solidFill>
-                <a:latin typeface="微软雅黑" charset="0"/>
-                <a:ea typeface="微软雅黑" charset="0"/>
-              </a:rPr>
-              <a:t>数据确定剩余能量</a:t>
-            </a:r>
-            <a:endParaRPr lang="zh-CN" altLang="en-US" sz="2800">
-              <a:solidFill>
-                <a:schemeClr val="bg1"/>
-              </a:solidFill>
-              <a:latin typeface="微软雅黑" charset="0"/>
-              <a:ea typeface="微软雅黑" charset="0"/>
-            </a:endParaRPr>
-          </a:p>
-          <a:p>
-            <a:r>
-              <a:rPr lang="zh-CN" altLang="en-US" sz="2800">
-                <a:solidFill>
-                  <a:schemeClr val="bg1"/>
-                </a:solidFill>
-                <a:latin typeface="微软雅黑" charset="0"/>
-                <a:ea typeface="微软雅黑" charset="0"/>
-              </a:rPr>
-              <a:t>还需要多少以及当</a:t>
-            </a:r>
-            <a:endParaRPr lang="zh-CN" altLang="en-US" sz="2800">
-              <a:solidFill>
-                <a:schemeClr val="bg1"/>
-              </a:solidFill>
-              <a:latin typeface="微软雅黑" charset="0"/>
-              <a:ea typeface="微软雅黑" charset="0"/>
-            </a:endParaRPr>
-          </a:p>
-          <a:p>
-            <a:r>
-              <a:rPr lang="zh-CN" altLang="en-US" sz="2800">
-                <a:solidFill>
-                  <a:schemeClr val="bg1"/>
-                </a:solidFill>
-                <a:latin typeface="微软雅黑" charset="0"/>
-                <a:ea typeface="微软雅黑" charset="0"/>
-              </a:rPr>
-              <a:t>天计算结果</a:t>
-            </a:r>
-            <a:endParaRPr lang="zh-CN" altLang="en-US" sz="2800">
               <a:solidFill>
                 <a:schemeClr val="bg1"/>
               </a:solidFill>

</xml_diff>